<commit_message>
Update new powerpoint presentation
</commit_message>
<xml_diff>
--- a/presenationTWO.pptx
+++ b/presenationTWO.pptx
@@ -6,20 +6,18 @@
   </p:sldMasterIdLst>
   <p:sldIdLst>
     <p:sldId id="256" r:id="rId2"/>
-    <p:sldId id="257" r:id="rId3"/>
-    <p:sldId id="260" r:id="rId4"/>
-    <p:sldId id="272" r:id="rId5"/>
-    <p:sldId id="271" r:id="rId6"/>
-    <p:sldId id="269" r:id="rId7"/>
-    <p:sldId id="265" r:id="rId8"/>
+    <p:sldId id="274" r:id="rId3"/>
+    <p:sldId id="257" r:id="rId4"/>
+    <p:sldId id="260" r:id="rId5"/>
+    <p:sldId id="272" r:id="rId6"/>
+    <p:sldId id="275" r:id="rId7"/>
+    <p:sldId id="269" r:id="rId8"/>
     <p:sldId id="266" r:id="rId9"/>
-    <p:sldId id="261" r:id="rId10"/>
-    <p:sldId id="267" r:id="rId11"/>
-    <p:sldId id="262" r:id="rId12"/>
-    <p:sldId id="263" r:id="rId13"/>
-    <p:sldId id="273" r:id="rId14"/>
-    <p:sldId id="264" r:id="rId15"/>
-    <p:sldId id="270" r:id="rId16"/>
+    <p:sldId id="276" r:id="rId10"/>
+    <p:sldId id="277" r:id="rId11"/>
+    <p:sldId id="273" r:id="rId12"/>
+    <p:sldId id="264" r:id="rId13"/>
+    <p:sldId id="270" r:id="rId14"/>
   </p:sldIdLst>
   <p:sldSz cx="9144000" cy="6858000" type="screen4x3"/>
   <p:notesSz cx="6858000" cy="9144000"/>
@@ -121,464 +119,6 @@
 </p:presentation>
 </file>
 
-<file path=ppt/charts/chart1.xml><?xml version="1.0" encoding="utf-8"?>
-<c:chartSpace xmlns:c="http://schemas.openxmlformats.org/drawingml/2006/chart" xmlns:a="http://schemas.openxmlformats.org/drawingml/2006/main" xmlns:r="http://schemas.openxmlformats.org/officeDocument/2006/relationships">
-  <c:date1904 val="0"/>
-  <c:lang val="en-US"/>
-  <c:roundedCorners val="0"/>
-  <mc:AlternateContent xmlns:mc="http://schemas.openxmlformats.org/markup-compatibility/2006">
-    <mc:Choice xmlns:c14="http://schemas.microsoft.com/office/drawing/2007/8/2/chart" Requires="c14">
-      <c14:style val="118"/>
-    </mc:Choice>
-    <mc:Fallback>
-      <c:style val="18"/>
-    </mc:Fallback>
-  </mc:AlternateContent>
-  <c:chart>
-    <c:autoTitleDeleted val="0"/>
-    <c:plotArea>
-      <c:layout>
-        <c:manualLayout>
-          <c:layoutTarget val="inner"/>
-          <c:xMode val="edge"/>
-          <c:yMode val="edge"/>
-          <c:x val="0.417708272577039"/>
-          <c:y val="0.0570932639086974"/>
-          <c:w val="0.455496297498895"/>
-          <c:h val="0.896917703835408"/>
-        </c:manualLayout>
-      </c:layout>
-      <c:barChart>
-        <c:barDir val="bar"/>
-        <c:grouping val="stacked"/>
-        <c:varyColors val="0"/>
-        <c:ser>
-          <c:idx val="0"/>
-          <c:order val="0"/>
-          <c:tx>
-            <c:strRef>
-              <c:f>Sheet1!$B$1</c:f>
-              <c:strCache>
-                <c:ptCount val="1"/>
-              </c:strCache>
-            </c:strRef>
-          </c:tx>
-          <c:spPr>
-            <a:noFill/>
-            <a:effectLst/>
-          </c:spPr>
-          <c:invertIfNegative val="0"/>
-          <c:cat>
-            <c:strRef>
-              <c:f>Sheet1!$A$2:$A$14</c:f>
-              <c:strCache>
-                <c:ptCount val="13"/>
-                <c:pt idx="0">
-                  <c:v>Collect Data and Analysis of Frequency</c:v>
-                </c:pt>
-                <c:pt idx="1">
-                  <c:v>Create Initial Game Menu</c:v>
-                </c:pt>
-                <c:pt idx="2">
-                  <c:v>Analyize Data and Collect of Beats Per Minute (bpm)</c:v>
-                </c:pt>
-                <c:pt idx="3">
-                  <c:v>Map Sprites to Respond to Collected Data</c:v>
-                </c:pt>
-                <c:pt idx="4">
-                  <c:v>Set-Up Basic Window</c:v>
-                </c:pt>
-                <c:pt idx="5">
-                  <c:v>Response of Sprite to User Input</c:v>
-                </c:pt>
-                <c:pt idx="6">
-                  <c:v>Create Skeleton of the First Several Levels</c:v>
-                </c:pt>
-                <c:pt idx="7">
-                  <c:v>Have Basic Collision Detection Between Obstacles and Main Player</c:v>
-                </c:pt>
-                <c:pt idx="8">
-                  <c:v>Finish User Interface</c:v>
-                </c:pt>
-                <c:pt idx="9">
-                  <c:v>Add Features and More Complete Setting to Menus</c:v>
-                </c:pt>
-                <c:pt idx="10">
-                  <c:v>Impliment More Advanced Mapping of Game Sprites to Audio</c:v>
-                </c:pt>
-                <c:pt idx="11">
-                  <c:v>Debug Code by Testing</c:v>
-                </c:pt>
-                <c:pt idx="12">
-                  <c:v>Develop and Polish More Levels of Game and Set Options for Difficulty and Rate of Game Play</c:v>
-                </c:pt>
-              </c:strCache>
-            </c:strRef>
-          </c:cat>
-          <c:val>
-            <c:numRef>
-              <c:f>Sheet1!$B$2:$B$14</c:f>
-              <c:numCache>
-                <c:formatCode>d\-mmm</c:formatCode>
-                <c:ptCount val="13"/>
-                <c:pt idx="0">
-                  <c:v>40843.0</c:v>
-                </c:pt>
-                <c:pt idx="1">
-                  <c:v>40843.0</c:v>
-                </c:pt>
-                <c:pt idx="2">
-                  <c:v>40845.0</c:v>
-                </c:pt>
-                <c:pt idx="3">
-                  <c:v>40845.0</c:v>
-                </c:pt>
-                <c:pt idx="4">
-                  <c:v>40850.0</c:v>
-                </c:pt>
-                <c:pt idx="5">
-                  <c:v>40850.0</c:v>
-                </c:pt>
-                <c:pt idx="6">
-                  <c:v>40851.0</c:v>
-                </c:pt>
-                <c:pt idx="7">
-                  <c:v>40853.0</c:v>
-                </c:pt>
-                <c:pt idx="8">
-                  <c:v>40856.0</c:v>
-                </c:pt>
-                <c:pt idx="9">
-                  <c:v>40857.0</c:v>
-                </c:pt>
-                <c:pt idx="10">
-                  <c:v>40859.0</c:v>
-                </c:pt>
-                <c:pt idx="11">
-                  <c:v>40867.0</c:v>
-                </c:pt>
-                <c:pt idx="12">
-                  <c:v>40868.0</c:v>
-                </c:pt>
-              </c:numCache>
-            </c:numRef>
-          </c:val>
-        </c:ser>
-        <c:ser>
-          <c:idx val="1"/>
-          <c:order val="1"/>
-          <c:tx>
-            <c:strRef>
-              <c:f>Sheet1!$C$1</c:f>
-              <c:strCache>
-                <c:ptCount val="1"/>
-                <c:pt idx="0">
-                  <c:v>Completed</c:v>
-                </c:pt>
-              </c:strCache>
-            </c:strRef>
-          </c:tx>
-          <c:spPr>
-            <a:pattFill prst="dotDmnd">
-              <a:fgClr>
-                <a:prstClr val="black"/>
-              </a:fgClr>
-              <a:bgClr>
-                <a:prstClr val="white"/>
-              </a:bgClr>
-            </a:pattFill>
-          </c:spPr>
-          <c:invertIfNegative val="0"/>
-          <c:cat>
-            <c:strRef>
-              <c:f>Sheet1!$A$2:$A$14</c:f>
-              <c:strCache>
-                <c:ptCount val="13"/>
-                <c:pt idx="0">
-                  <c:v>Collect Data and Analysis of Frequency</c:v>
-                </c:pt>
-                <c:pt idx="1">
-                  <c:v>Create Initial Game Menu</c:v>
-                </c:pt>
-                <c:pt idx="2">
-                  <c:v>Analyize Data and Collect of Beats Per Minute (bpm)</c:v>
-                </c:pt>
-                <c:pt idx="3">
-                  <c:v>Map Sprites to Respond to Collected Data</c:v>
-                </c:pt>
-                <c:pt idx="4">
-                  <c:v>Set-Up Basic Window</c:v>
-                </c:pt>
-                <c:pt idx="5">
-                  <c:v>Response of Sprite to User Input</c:v>
-                </c:pt>
-                <c:pt idx="6">
-                  <c:v>Create Skeleton of the First Several Levels</c:v>
-                </c:pt>
-                <c:pt idx="7">
-                  <c:v>Have Basic Collision Detection Between Obstacles and Main Player</c:v>
-                </c:pt>
-                <c:pt idx="8">
-                  <c:v>Finish User Interface</c:v>
-                </c:pt>
-                <c:pt idx="9">
-                  <c:v>Add Features and More Complete Setting to Menus</c:v>
-                </c:pt>
-                <c:pt idx="10">
-                  <c:v>Impliment More Advanced Mapping of Game Sprites to Audio</c:v>
-                </c:pt>
-                <c:pt idx="11">
-                  <c:v>Debug Code by Testing</c:v>
-                </c:pt>
-                <c:pt idx="12">
-                  <c:v>Develop and Polish More Levels of Game and Set Options for Difficulty and Rate of Game Play</c:v>
-                </c:pt>
-              </c:strCache>
-            </c:strRef>
-          </c:cat>
-          <c:val>
-            <c:numRef>
-              <c:f>Sheet1!$C$2:$C$14</c:f>
-              <c:numCache>
-                <c:formatCode>General</c:formatCode>
-                <c:ptCount val="13"/>
-                <c:pt idx="0">
-                  <c:v>11.0</c:v>
-                </c:pt>
-                <c:pt idx="1">
-                  <c:v>7.0</c:v>
-                </c:pt>
-                <c:pt idx="2">
-                  <c:v>10.0</c:v>
-                </c:pt>
-                <c:pt idx="3">
-                  <c:v>8.0</c:v>
-                </c:pt>
-                <c:pt idx="4">
-                  <c:v>4.0</c:v>
-                </c:pt>
-                <c:pt idx="5">
-                  <c:v>5.0</c:v>
-                </c:pt>
-                <c:pt idx="6">
-                  <c:v>0.0</c:v>
-                </c:pt>
-                <c:pt idx="7">
-                  <c:v>2.0</c:v>
-                </c:pt>
-                <c:pt idx="8">
-                  <c:v>0.0</c:v>
-                </c:pt>
-                <c:pt idx="9">
-                  <c:v>0.0</c:v>
-                </c:pt>
-                <c:pt idx="10">
-                  <c:v>0.0</c:v>
-                </c:pt>
-                <c:pt idx="11">
-                  <c:v>0.0</c:v>
-                </c:pt>
-                <c:pt idx="12">
-                  <c:v>0.0</c:v>
-                </c:pt>
-              </c:numCache>
-            </c:numRef>
-          </c:val>
-        </c:ser>
-        <c:ser>
-          <c:idx val="2"/>
-          <c:order val="2"/>
-          <c:tx>
-            <c:strRef>
-              <c:f>Sheet1!$D$1</c:f>
-              <c:strCache>
-                <c:ptCount val="1"/>
-                <c:pt idx="0">
-                  <c:v>Remaining</c:v>
-                </c:pt>
-              </c:strCache>
-            </c:strRef>
-          </c:tx>
-          <c:spPr>
-            <a:pattFill prst="horzBrick">
-              <a:fgClr>
-                <a:prstClr val="black"/>
-              </a:fgClr>
-              <a:bgClr>
-                <a:prstClr val="white"/>
-              </a:bgClr>
-            </a:pattFill>
-          </c:spPr>
-          <c:invertIfNegative val="0"/>
-          <c:cat>
-            <c:strRef>
-              <c:f>Sheet1!$A$2:$A$14</c:f>
-              <c:strCache>
-                <c:ptCount val="13"/>
-                <c:pt idx="0">
-                  <c:v>Collect Data and Analysis of Frequency</c:v>
-                </c:pt>
-                <c:pt idx="1">
-                  <c:v>Create Initial Game Menu</c:v>
-                </c:pt>
-                <c:pt idx="2">
-                  <c:v>Analyize Data and Collect of Beats Per Minute (bpm)</c:v>
-                </c:pt>
-                <c:pt idx="3">
-                  <c:v>Map Sprites to Respond to Collected Data</c:v>
-                </c:pt>
-                <c:pt idx="4">
-                  <c:v>Set-Up Basic Window</c:v>
-                </c:pt>
-                <c:pt idx="5">
-                  <c:v>Response of Sprite to User Input</c:v>
-                </c:pt>
-                <c:pt idx="6">
-                  <c:v>Create Skeleton of the First Several Levels</c:v>
-                </c:pt>
-                <c:pt idx="7">
-                  <c:v>Have Basic Collision Detection Between Obstacles and Main Player</c:v>
-                </c:pt>
-                <c:pt idx="8">
-                  <c:v>Finish User Interface</c:v>
-                </c:pt>
-                <c:pt idx="9">
-                  <c:v>Add Features and More Complete Setting to Menus</c:v>
-                </c:pt>
-                <c:pt idx="10">
-                  <c:v>Impliment More Advanced Mapping of Game Sprites to Audio</c:v>
-                </c:pt>
-                <c:pt idx="11">
-                  <c:v>Debug Code by Testing</c:v>
-                </c:pt>
-                <c:pt idx="12">
-                  <c:v>Develop and Polish More Levels of Game and Set Options for Difficulty and Rate of Game Play</c:v>
-                </c:pt>
-              </c:strCache>
-            </c:strRef>
-          </c:cat>
-          <c:val>
-            <c:numRef>
-              <c:f>Sheet1!$D$2:$D$14</c:f>
-              <c:numCache>
-                <c:formatCode>General</c:formatCode>
-                <c:ptCount val="13"/>
-                <c:pt idx="0">
-                  <c:v>6.0</c:v>
-                </c:pt>
-                <c:pt idx="1">
-                  <c:v>0.0</c:v>
-                </c:pt>
-                <c:pt idx="2">
-                  <c:v>5.0</c:v>
-                </c:pt>
-                <c:pt idx="3">
-                  <c:v>0.0</c:v>
-                </c:pt>
-                <c:pt idx="4">
-                  <c:v>0.0</c:v>
-                </c:pt>
-                <c:pt idx="5">
-                  <c:v>3.0</c:v>
-                </c:pt>
-                <c:pt idx="6">
-                  <c:v>10.0</c:v>
-                </c:pt>
-                <c:pt idx="7">
-                  <c:v>0.0</c:v>
-                </c:pt>
-                <c:pt idx="8">
-                  <c:v>4.0</c:v>
-                </c:pt>
-                <c:pt idx="9">
-                  <c:v>6.0</c:v>
-                </c:pt>
-                <c:pt idx="10">
-                  <c:v>10.0</c:v>
-                </c:pt>
-                <c:pt idx="11">
-                  <c:v>2.0</c:v>
-                </c:pt>
-                <c:pt idx="12">
-                  <c:v>3.0</c:v>
-                </c:pt>
-              </c:numCache>
-            </c:numRef>
-          </c:val>
-        </c:ser>
-        <c:dLbls>
-          <c:showLegendKey val="0"/>
-          <c:showVal val="0"/>
-          <c:showCatName val="0"/>
-          <c:showSerName val="0"/>
-          <c:showPercent val="0"/>
-          <c:showBubbleSize val="0"/>
-        </c:dLbls>
-        <c:gapWidth val="150"/>
-        <c:overlap val="100"/>
-        <c:axId val="2094041496"/>
-        <c:axId val="2094038456"/>
-      </c:barChart>
-      <c:catAx>
-        <c:axId val="2094041496"/>
-        <c:scaling>
-          <c:orientation val="maxMin"/>
-        </c:scaling>
-        <c:delete val="0"/>
-        <c:axPos val="l"/>
-        <c:majorTickMark val="out"/>
-        <c:minorTickMark val="none"/>
-        <c:tickLblPos val="nextTo"/>
-        <c:crossAx val="2094038456"/>
-        <c:crosses val="autoZero"/>
-        <c:auto val="1"/>
-        <c:lblAlgn val="ctr"/>
-        <c:lblOffset val="100"/>
-        <c:noMultiLvlLbl val="0"/>
-      </c:catAx>
-      <c:valAx>
-        <c:axId val="2094038456"/>
-        <c:scaling>
-          <c:orientation val="minMax"/>
-          <c:max val="40870.0"/>
-          <c:min val="40843.0"/>
-        </c:scaling>
-        <c:delete val="0"/>
-        <c:axPos val="t"/>
-        <c:majorGridlines/>
-        <c:numFmt formatCode="d\-mmm" sourceLinked="1"/>
-        <c:majorTickMark val="out"/>
-        <c:minorTickMark val="none"/>
-        <c:tickLblPos val="nextTo"/>
-        <c:crossAx val="2094041496"/>
-        <c:crosses val="autoZero"/>
-        <c:crossBetween val="between"/>
-      </c:valAx>
-    </c:plotArea>
-    <c:legend>
-      <c:legendPos val="r"/>
-      <c:layout>
-        <c:manualLayout>
-          <c:xMode val="edge"/>
-          <c:yMode val="edge"/>
-          <c:x val="0.86879776479553"/>
-          <c:y val="0.269512144315294"/>
-          <c:w val="0.119589331978664"/>
-          <c:h val="0.238753280839895"/>
-        </c:manualLayout>
-      </c:layout>
-      <c:overlay val="0"/>
-    </c:legend>
-    <c:plotVisOnly val="1"/>
-    <c:dispBlanksAs val="gap"/>
-    <c:showDLblsOverMax val="0"/>
-  </c:chart>
-  <c:externalData r:id="rId1">
-    <c:autoUpdate val="0"/>
-  </c:externalData>
-</c:chartSpace>
-</file>
-
 <file path=ppt/slideLayouts/slideLayout1.xml><?xml version="1.0" encoding="utf-8"?>
 <p:sldLayout xmlns:a="http://schemas.openxmlformats.org/drawingml/2006/main" xmlns:r="http://schemas.openxmlformats.org/officeDocument/2006/relationships" xmlns:p="http://schemas.openxmlformats.org/presentationml/2006/main" type="title" preserve="1">
   <p:cSld name="Title Slide">
@@ -760,7 +300,7 @@
           <a:p>
             <a:fld id="{CAF76F7E-B1F9-4A83-B249-B1B3F09A72E9}" type="datetimeFigureOut">
               <a:rPr lang="en-US" smtClean="0"/>
-              <a:t>12/4/11</a:t>
+              <a:t>12/5/11</a:t>
             </a:fld>
             <a:endParaRPr lang="en-US"/>
           </a:p>
@@ -930,7 +470,7 @@
           <a:p>
             <a:fld id="{CAF76F7E-B1F9-4A83-B249-B1B3F09A72E9}" type="datetimeFigureOut">
               <a:rPr lang="en-US" smtClean="0"/>
-              <a:t>12/4/11</a:t>
+              <a:t>12/5/11</a:t>
             </a:fld>
             <a:endParaRPr lang="en-US"/>
           </a:p>
@@ -1110,7 +650,7 @@
           <a:p>
             <a:fld id="{CAF76F7E-B1F9-4A83-B249-B1B3F09A72E9}" type="datetimeFigureOut">
               <a:rPr lang="en-US" smtClean="0"/>
-              <a:t>12/4/11</a:t>
+              <a:t>12/5/11</a:t>
             </a:fld>
             <a:endParaRPr lang="en-US"/>
           </a:p>
@@ -1280,7 +820,7 @@
           <a:p>
             <a:fld id="{CAF76F7E-B1F9-4A83-B249-B1B3F09A72E9}" type="datetimeFigureOut">
               <a:rPr lang="en-US" smtClean="0"/>
-              <a:t>12/4/11</a:t>
+              <a:t>12/5/11</a:t>
             </a:fld>
             <a:endParaRPr lang="en-US"/>
           </a:p>
@@ -1526,7 +1066,7 @@
           <a:p>
             <a:fld id="{CAF76F7E-B1F9-4A83-B249-B1B3F09A72E9}" type="datetimeFigureOut">
               <a:rPr lang="en-US" smtClean="0"/>
-              <a:t>12/4/11</a:t>
+              <a:t>12/5/11</a:t>
             </a:fld>
             <a:endParaRPr lang="en-US"/>
           </a:p>
@@ -1814,7 +1354,7 @@
           <a:p>
             <a:fld id="{CAF76F7E-B1F9-4A83-B249-B1B3F09A72E9}" type="datetimeFigureOut">
               <a:rPr lang="en-US" smtClean="0"/>
-              <a:t>12/4/11</a:t>
+              <a:t>12/5/11</a:t>
             </a:fld>
             <a:endParaRPr lang="en-US"/>
           </a:p>
@@ -2236,7 +1776,7 @@
           <a:p>
             <a:fld id="{CAF76F7E-B1F9-4A83-B249-B1B3F09A72E9}" type="datetimeFigureOut">
               <a:rPr lang="en-US" smtClean="0"/>
-              <a:t>12/4/11</a:t>
+              <a:t>12/5/11</a:t>
             </a:fld>
             <a:endParaRPr lang="en-US"/>
           </a:p>
@@ -2354,7 +1894,7 @@
           <a:p>
             <a:fld id="{CAF76F7E-B1F9-4A83-B249-B1B3F09A72E9}" type="datetimeFigureOut">
               <a:rPr lang="en-US" smtClean="0"/>
-              <a:t>12/4/11</a:t>
+              <a:t>12/5/11</a:t>
             </a:fld>
             <a:endParaRPr lang="en-US"/>
           </a:p>
@@ -2449,7 +1989,7 @@
           <a:p>
             <a:fld id="{CAF76F7E-B1F9-4A83-B249-B1B3F09A72E9}" type="datetimeFigureOut">
               <a:rPr lang="en-US" smtClean="0"/>
-              <a:t>12/4/11</a:t>
+              <a:t>12/5/11</a:t>
             </a:fld>
             <a:endParaRPr lang="en-US"/>
           </a:p>
@@ -2726,7 +2266,7 @@
           <a:p>
             <a:fld id="{CAF76F7E-B1F9-4A83-B249-B1B3F09A72E9}" type="datetimeFigureOut">
               <a:rPr lang="en-US" smtClean="0"/>
-              <a:t>12/4/11</a:t>
+              <a:t>12/5/11</a:t>
             </a:fld>
             <a:endParaRPr lang="en-US"/>
           </a:p>
@@ -2979,7 +2519,7 @@
           <a:p>
             <a:fld id="{CAF76F7E-B1F9-4A83-B249-B1B3F09A72E9}" type="datetimeFigureOut">
               <a:rPr lang="en-US" smtClean="0"/>
-              <a:t>12/4/11</a:t>
+              <a:t>12/5/11</a:t>
             </a:fld>
             <a:endParaRPr lang="en-US"/>
           </a:p>
@@ -3192,7 +2732,7 @@
           <a:p>
             <a:fld id="{CAF76F7E-B1F9-4A83-B249-B1B3F09A72E9}" type="datetimeFigureOut">
               <a:rPr lang="en-US" smtClean="0"/>
-              <a:t>12/4/11</a:t>
+              <a:t>12/5/11</a:t>
             </a:fld>
             <a:endParaRPr lang="en-US"/>
           </a:p>
@@ -3613,7 +3153,7 @@
         </p:spPr>
         <p:txBody>
           <a:bodyPr>
-            <a:normAutofit fontScale="92500"/>
+            <a:normAutofit fontScale="92500" lnSpcReduction="20000"/>
           </a:bodyPr>
           <a:lstStyle/>
           <a:p>
@@ -3646,6 +3186,21 @@
             <a:r>
               <a:rPr lang="en-US" dirty="0" err="1" smtClean="0"/>
               <a:t>Pennebacker</a:t>
+            </a:r>
+            <a:endParaRPr lang="en-US" dirty="0" smtClean="0"/>
+          </a:p>
+          <a:p>
+            <a:r>
+              <a:rPr lang="en-US" dirty="0" smtClean="0"/>
+              <a:t>Date: December 7</a:t>
+            </a:r>
+            <a:r>
+              <a:rPr lang="en-US" baseline="30000" dirty="0" smtClean="0"/>
+              <a:t>th</a:t>
+            </a:r>
+            <a:r>
+              <a:rPr lang="en-US" dirty="0" smtClean="0"/>
+              <a:t>, 2011</a:t>
             </a:r>
             <a:endParaRPr lang="en-US" dirty="0"/>
           </a:p>
@@ -3735,166 +3290,37 @@
           <a:p>
             <a:r>
               <a:rPr lang="en-US" dirty="0" smtClean="0"/>
-              <a:t>Gantt Chart</a:t>
+              <a:t>Rewarding yet Satisfying</a:t>
             </a:r>
             <a:endParaRPr lang="en-US" dirty="0"/>
           </a:p>
         </p:txBody>
       </p:sp>
-      <p:graphicFrame>
-        <p:nvGraphicFramePr>
-          <p:cNvPr id="4" name="Content Placeholder 3"/>
-          <p:cNvGraphicFramePr>
-            <a:graphicFrameLocks noGrp="1"/>
-          </p:cNvGraphicFramePr>
+      <p:sp>
+        <p:nvSpPr>
+          <p:cNvPr id="3" name="Content Placeholder 2"/>
+          <p:cNvSpPr>
+            <a:spLocks noGrp="1"/>
+          </p:cNvSpPr>
           <p:nvPr>
             <p:ph idx="1"/>
-            <p:extLst>
-              <p:ext uri="{D42A27DB-BD31-4B8C-83A1-F6EECF244321}">
-                <p14:modId xmlns:p14="http://schemas.microsoft.com/office/powerpoint/2010/main" val="3509556602"/>
-              </p:ext>
-            </p:extLst>
-          </p:nvPr>
-        </p:nvGraphicFramePr>
-        <p:xfrm>
-          <a:off x="457200" y="1295400"/>
-          <a:ext cx="8229600" cy="4525963"/>
-        </p:xfrm>
-        <a:graphic>
-          <a:graphicData uri="http://schemas.openxmlformats.org/drawingml/2006/chart">
-            <c:chart xmlns:c="http://schemas.openxmlformats.org/drawingml/2006/chart" xmlns:r="http://schemas.openxmlformats.org/officeDocument/2006/relationships" r:id="rId2"/>
-          </a:graphicData>
-        </a:graphic>
-      </p:graphicFrame>
-      <p:pic>
-        <p:nvPicPr>
-          <p:cNvPr id="7" name="Picture 6" descr="that1group-logo-white.jpg"/>
-          <p:cNvPicPr>
-            <a:picLocks noChangeAspect="1"/>
-          </p:cNvPicPr>
-          <p:nvPr/>
-        </p:nvPicPr>
-        <p:blipFill>
-          <a:blip r:embed="rId3">
-            <a:extLst>
-              <a:ext uri="{28A0092B-C50C-407E-A947-70E740481C1C}">
-                <a14:useLocalDpi xmlns:a14="http://schemas.microsoft.com/office/drawing/2010/main" val="0"/>
-              </a:ext>
-            </a:extLst>
-          </a:blip>
-          <a:stretch>
-            <a:fillRect/>
-          </a:stretch>
-        </p:blipFill>
-        <p:spPr>
-          <a:xfrm>
-            <a:off x="7366000" y="5715000"/>
-            <a:ext cx="1524000" cy="1143000"/>
-          </a:xfrm>
-          <a:prstGeom prst="rect">
-            <a:avLst/>
-          </a:prstGeom>
-        </p:spPr>
-      </p:pic>
-    </p:spTree>
-    <p:extLst>
-      <p:ext uri="{BB962C8B-B14F-4D97-AF65-F5344CB8AC3E}">
-        <p14:creationId xmlns:p14="http://schemas.microsoft.com/office/powerpoint/2010/main" val="1111077571"/>
-      </p:ext>
-    </p:extLst>
-  </p:cSld>
-  <p:clrMapOvr>
-    <a:masterClrMapping/>
-  </p:clrMapOvr>
-  <p:timing>
-    <p:tnLst>
-      <p:par>
-        <p:cTn xmlns:p14="http://schemas.microsoft.com/office/powerpoint/2010/main" id="1" dur="indefinite" restart="never" nodeType="tmRoot"/>
-      </p:par>
-    </p:tnLst>
-  </p:timing>
-</p:sld>
-</file>
-
-<file path=ppt/slides/slide11.xml><?xml version="1.0" encoding="utf-8"?>
-<p:sld xmlns:a="http://schemas.openxmlformats.org/drawingml/2006/main" xmlns:r="http://schemas.openxmlformats.org/officeDocument/2006/relationships" xmlns:p="http://schemas.openxmlformats.org/presentationml/2006/main">
-  <p:cSld>
-    <p:spTree>
-      <p:nvGrpSpPr>
-        <p:cNvPr id="1" name=""/>
-        <p:cNvGrpSpPr/>
-        <p:nvPr/>
-      </p:nvGrpSpPr>
-      <p:grpSpPr>
-        <a:xfrm>
-          <a:off x="0" y="0"/>
-          <a:ext cx="0" cy="0"/>
-          <a:chOff x="0" y="0"/>
-          <a:chExt cx="0" cy="0"/>
-        </a:xfrm>
-      </p:grpSpPr>
-      <p:sp>
-        <p:nvSpPr>
-          <p:cNvPr id="2" name="Title 1"/>
-          <p:cNvSpPr>
-            <a:spLocks noGrp="1"/>
-          </p:cNvSpPr>
-          <p:nvPr>
-            <p:ph type="title"/>
-          </p:nvPr>
-        </p:nvSpPr>
-        <p:spPr/>
-        <p:txBody>
-          <a:bodyPr/>
-          <a:lstStyle/>
-          <a:p>
-            <a:r>
-              <a:rPr lang="en-US" dirty="0" smtClean="0"/>
-              <a:t>What tasks are complete?</a:t>
-            </a:r>
-            <a:endParaRPr lang="en-US" dirty="0"/>
-          </a:p>
-        </p:txBody>
-      </p:sp>
-      <p:sp>
-        <p:nvSpPr>
-          <p:cNvPr id="3" name="Content Placeholder 2"/>
-          <p:cNvSpPr>
-            <a:spLocks noGrp="1"/>
-          </p:cNvSpPr>
-          <p:nvPr>
-            <p:ph idx="1"/>
-          </p:nvPr>
-        </p:nvSpPr>
-        <p:spPr/>
-        <p:txBody>
-          <a:bodyPr/>
-          <a:lstStyle/>
-          <a:p>
-            <a:r>
-              <a:rPr lang="en-US" dirty="0" smtClean="0"/>
-              <a:t>Create initial game menus and windows.</a:t>
-            </a:r>
-          </a:p>
-          <a:p>
-            <a:r>
-              <a:rPr lang="en-US" dirty="0" smtClean="0"/>
-              <a:t>Map sprites to respond to input.</a:t>
-            </a:r>
-          </a:p>
-          <a:p>
-            <a:r>
-              <a:rPr lang="en-US" dirty="0" smtClean="0"/>
-              <a:t>Have basic collision detection.</a:t>
-            </a:r>
-          </a:p>
-          <a:p>
-            <a:endParaRPr lang="en-US" dirty="0" smtClean="0"/>
-          </a:p>
-          <a:p>
-            <a:endParaRPr lang="en-US" dirty="0" smtClean="0"/>
-          </a:p>
-          <a:p>
+          </p:nvPr>
+        </p:nvSpPr>
+        <p:spPr/>
+        <p:txBody>
+          <a:bodyPr/>
+          <a:lstStyle/>
+          <a:p>
+            <a:r>
+              <a:rPr lang="en-US" dirty="0" smtClean="0"/>
+              <a:t>(Discuss the rewards system)</a:t>
+            </a:r>
+          </a:p>
+          <a:p>
+            <a:r>
+              <a:rPr lang="en-US" dirty="0" smtClean="0"/>
+              <a:t>(Add a photo of rewards system)</a:t>
+            </a:r>
             <a:endParaRPr lang="en-US" dirty="0"/>
           </a:p>
         </p:txBody>
@@ -3932,24 +3358,17 @@
     </p:spTree>
     <p:extLst>
       <p:ext uri="{BB962C8B-B14F-4D97-AF65-F5344CB8AC3E}">
-        <p14:creationId xmlns:p14="http://schemas.microsoft.com/office/powerpoint/2010/main" val="3642860195"/>
+        <p14:creationId xmlns:p14="http://schemas.microsoft.com/office/powerpoint/2010/main" val="1423793444"/>
       </p:ext>
     </p:extLst>
   </p:cSld>
   <p:clrMapOvr>
     <a:masterClrMapping/>
   </p:clrMapOvr>
-  <p:timing>
-    <p:tnLst>
-      <p:par>
-        <p:cTn xmlns:p14="http://schemas.microsoft.com/office/powerpoint/2010/main" id="1" dur="indefinite" restart="never" nodeType="tmRoot"/>
-      </p:par>
-    </p:tnLst>
-  </p:timing>
 </p:sld>
 </file>
 
-<file path=ppt/slides/slide12.xml><?xml version="1.0" encoding="utf-8"?>
+<file path=ppt/slides/slide11.xml><?xml version="1.0" encoding="utf-8"?>
 <p:sld xmlns:a="http://schemas.openxmlformats.org/drawingml/2006/main" xmlns:r="http://schemas.openxmlformats.org/officeDocument/2006/relationships" xmlns:p="http://schemas.openxmlformats.org/presentationml/2006/main">
   <p:cSld>
     <p:spTree>
@@ -3982,8 +3401,8 @@
           <a:lstStyle/>
           <a:p>
             <a:r>
-              <a:rPr lang="en-US" dirty="0" smtClean="0"/>
-              <a:t>What do we still have to do?</a:t>
+              <a:rPr lang="en-US" smtClean="0"/>
+              <a:t>WE NEEDZ ANOTHER SLIDE</a:t>
             </a:r>
             <a:endParaRPr lang="en-US" dirty="0"/>
           </a:p>
@@ -4004,161 +3423,6 @@
           <a:bodyPr/>
           <a:lstStyle/>
           <a:p>
-            <a:r>
-              <a:rPr lang="en-US" dirty="0" smtClean="0"/>
-              <a:t>Collect data and analyze frequency.</a:t>
-            </a:r>
-          </a:p>
-          <a:p>
-            <a:r>
-              <a:rPr lang="en-US" dirty="0" smtClean="0"/>
-              <a:t>Have sprite respond to user input.</a:t>
-            </a:r>
-          </a:p>
-          <a:p>
-            <a:r>
-              <a:rPr lang="en-US" dirty="0" smtClean="0"/>
-              <a:t>Finish and finalize user interfaces.</a:t>
-            </a:r>
-          </a:p>
-          <a:p>
-            <a:r>
-              <a:rPr lang="en-US" dirty="0" smtClean="0"/>
-              <a:t>Create skeleton of levels.</a:t>
-            </a:r>
-          </a:p>
-          <a:p>
-            <a:r>
-              <a:rPr lang="en-US" dirty="0" smtClean="0"/>
-              <a:t>Implement advanced music selection.</a:t>
-            </a:r>
-          </a:p>
-          <a:p>
-            <a:r>
-              <a:rPr lang="en-US" dirty="0" smtClean="0"/>
-              <a:t>Debug and clean up code.</a:t>
-            </a:r>
-          </a:p>
-          <a:p>
-            <a:endParaRPr lang="en-US" dirty="0" smtClean="0"/>
-          </a:p>
-          <a:p>
-            <a:endParaRPr lang="en-US" dirty="0" smtClean="0"/>
-          </a:p>
-          <a:p>
-            <a:endParaRPr lang="en-US" dirty="0"/>
-          </a:p>
-        </p:txBody>
-      </p:sp>
-      <p:pic>
-        <p:nvPicPr>
-          <p:cNvPr id="4" name="Picture 3" descr="that1group-logo-white.jpg"/>
-          <p:cNvPicPr>
-            <a:picLocks noChangeAspect="1"/>
-          </p:cNvPicPr>
-          <p:nvPr/>
-        </p:nvPicPr>
-        <p:blipFill>
-          <a:blip r:embed="rId2">
-            <a:extLst>
-              <a:ext uri="{28A0092B-C50C-407E-A947-70E740481C1C}">
-                <a14:useLocalDpi xmlns:a14="http://schemas.microsoft.com/office/drawing/2010/main" val="0"/>
-              </a:ext>
-            </a:extLst>
-          </a:blip>
-          <a:stretch>
-            <a:fillRect/>
-          </a:stretch>
-        </p:blipFill>
-        <p:spPr>
-          <a:xfrm>
-            <a:off x="7366000" y="5715000"/>
-            <a:ext cx="1524000" cy="1143000"/>
-          </a:xfrm>
-          <a:prstGeom prst="rect">
-            <a:avLst/>
-          </a:prstGeom>
-        </p:spPr>
-      </p:pic>
-    </p:spTree>
-    <p:extLst>
-      <p:ext uri="{BB962C8B-B14F-4D97-AF65-F5344CB8AC3E}">
-        <p14:creationId xmlns:p14="http://schemas.microsoft.com/office/powerpoint/2010/main" val="3612047380"/>
-      </p:ext>
-    </p:extLst>
-  </p:cSld>
-  <p:clrMapOvr>
-    <a:masterClrMapping/>
-  </p:clrMapOvr>
-  <p:timing>
-    <p:tnLst>
-      <p:par>
-        <p:cTn xmlns:p14="http://schemas.microsoft.com/office/powerpoint/2010/main" id="1" dur="indefinite" restart="never" nodeType="tmRoot"/>
-      </p:par>
-    </p:tnLst>
-  </p:timing>
-</p:sld>
-</file>
-
-<file path=ppt/slides/slide13.xml><?xml version="1.0" encoding="utf-8"?>
-<p:sld xmlns:a="http://schemas.openxmlformats.org/drawingml/2006/main" xmlns:r="http://schemas.openxmlformats.org/officeDocument/2006/relationships" xmlns:p="http://schemas.openxmlformats.org/presentationml/2006/main">
-  <p:cSld>
-    <p:spTree>
-      <p:nvGrpSpPr>
-        <p:cNvPr id="1" name=""/>
-        <p:cNvGrpSpPr/>
-        <p:nvPr/>
-      </p:nvGrpSpPr>
-      <p:grpSpPr>
-        <a:xfrm>
-          <a:off x="0" y="0"/>
-          <a:ext cx="0" cy="0"/>
-          <a:chOff x="0" y="0"/>
-          <a:chExt cx="0" cy="0"/>
-        </a:xfrm>
-      </p:grpSpPr>
-      <p:sp>
-        <p:nvSpPr>
-          <p:cNvPr id="2" name="Title 1"/>
-          <p:cNvSpPr>
-            <a:spLocks noGrp="1"/>
-          </p:cNvSpPr>
-          <p:nvPr>
-            <p:ph type="title"/>
-          </p:nvPr>
-        </p:nvSpPr>
-        <p:spPr/>
-        <p:txBody>
-          <a:bodyPr/>
-          <a:lstStyle/>
-          <a:p>
-            <a:r>
-              <a:rPr lang="en-US" dirty="0" smtClean="0"/>
-              <a:t>TEST THE GAME HERE</a:t>
-            </a:r>
-            <a:endParaRPr lang="en-US" dirty="0"/>
-          </a:p>
-        </p:txBody>
-      </p:sp>
-      <p:sp>
-        <p:nvSpPr>
-          <p:cNvPr id="3" name="Content Placeholder 2"/>
-          <p:cNvSpPr>
-            <a:spLocks noGrp="1"/>
-          </p:cNvSpPr>
-          <p:nvPr>
-            <p:ph idx="1"/>
-          </p:nvPr>
-        </p:nvSpPr>
-        <p:spPr/>
-        <p:txBody>
-          <a:bodyPr/>
-          <a:lstStyle/>
-          <a:p>
-            <a:r>
-              <a:rPr lang="en-US" dirty="0" smtClean="0"/>
-              <a:t>We will put a test of the game on this slide</a:t>
-            </a:r>
             <a:endParaRPr lang="en-US" dirty="0"/>
           </a:p>
         </p:txBody>
@@ -4206,7 +3470,7 @@
 </p:sld>
 </file>
 
-<file path=ppt/slides/slide14.xml><?xml version="1.0" encoding="utf-8"?>
+<file path=ppt/slides/slide12.xml><?xml version="1.0" encoding="utf-8"?>
 <p:sld xmlns:a="http://schemas.openxmlformats.org/drawingml/2006/main" xmlns:r="http://schemas.openxmlformats.org/officeDocument/2006/relationships" xmlns:p="http://schemas.openxmlformats.org/presentationml/2006/main">
   <p:cSld>
     <p:spTree>
@@ -4240,7 +3504,7 @@
           <a:p>
             <a:r>
               <a:rPr lang="en-US" dirty="0" smtClean="0"/>
-              <a:t>What did we cover?</a:t>
+              <a:t>Conclusion</a:t>
             </a:r>
             <a:endParaRPr lang="en-US" dirty="0"/>
           </a:p>
@@ -4261,30 +3525,6 @@
           <a:bodyPr/>
           <a:lstStyle/>
           <a:p>
-            <a:r>
-              <a:rPr lang="en-US" dirty="0" smtClean="0"/>
-              <a:t>The social aspects of the game.</a:t>
-            </a:r>
-            <a:endParaRPr lang="en-US" dirty="0" smtClean="0"/>
-          </a:p>
-          <a:p>
-            <a:r>
-              <a:rPr lang="en-US" dirty="0" smtClean="0"/>
-              <a:t>The final product’s ins and outs.</a:t>
-            </a:r>
-            <a:endParaRPr lang="en-US" dirty="0" smtClean="0"/>
-          </a:p>
-          <a:p>
-            <a:r>
-              <a:rPr lang="en-US" dirty="0" smtClean="0"/>
-              <a:t>The progress of the product thus far.</a:t>
-            </a:r>
-          </a:p>
-          <a:p>
-            <a:r>
-              <a:rPr lang="en-US" dirty="0" smtClean="0"/>
-              <a:t>The testing of the final product.</a:t>
-            </a:r>
             <a:endParaRPr lang="en-US" dirty="0" smtClean="0"/>
           </a:p>
         </p:txBody>
@@ -4339,7 +3579,7 @@
 </p:sld>
 </file>
 
-<file path=ppt/slides/slide15.xml><?xml version="1.0" encoding="utf-8"?>
+<file path=ppt/slides/slide13.xml><?xml version="1.0" encoding="utf-8"?>
 <p:sld xmlns:a="http://schemas.openxmlformats.org/drawingml/2006/main" xmlns:r="http://schemas.openxmlformats.org/officeDocument/2006/relationships" xmlns:p="http://schemas.openxmlformats.org/presentationml/2006/main">
   <p:cSld>
     <p:spTree>
@@ -4372,8 +3612,12 @@
           <a:lstStyle/>
           <a:p>
             <a:r>
-              <a:rPr lang="en-US" smtClean="0"/>
-              <a:t>Contact Us?</a:t>
+              <a:rPr lang="en-US" dirty="0" smtClean="0"/>
+              <a:t>Contact </a:t>
+            </a:r>
+            <a:r>
+              <a:rPr lang="en-US" dirty="0" smtClean="0"/>
+              <a:t>Us</a:t>
             </a:r>
             <a:endParaRPr lang="en-US" dirty="0"/>
           </a:p>
@@ -4733,6 +3977,143 @@
         </p:nvSpPr>
         <p:spPr/>
         <p:txBody>
+          <a:bodyPr/>
+          <a:lstStyle/>
+          <a:p>
+            <a:r>
+              <a:rPr lang="en-US" dirty="0" smtClean="0"/>
+              <a:t>The Great Audio Race</a:t>
+            </a:r>
+            <a:endParaRPr lang="en-US" dirty="0"/>
+          </a:p>
+        </p:txBody>
+      </p:sp>
+      <p:pic>
+        <p:nvPicPr>
+          <p:cNvPr id="5" name="Content Placeholder 4"/>
+          <p:cNvPicPr>
+            <a:picLocks noGrp="1" noChangeAspect="1"/>
+          </p:cNvPicPr>
+          <p:nvPr>
+            <p:ph idx="1"/>
+          </p:nvPr>
+        </p:nvPicPr>
+        <p:blipFill>
+          <a:blip r:embed="rId2"/>
+          <a:srcRect l="1975" r="1975"/>
+          <a:stretch>
+            <a:fillRect/>
+          </a:stretch>
+        </p:blipFill>
+        <p:spPr>
+          <a:xfrm>
+            <a:off x="1219200" y="1600201"/>
+            <a:ext cx="6629400" cy="2819400"/>
+          </a:xfrm>
+        </p:spPr>
+      </p:pic>
+      <p:pic>
+        <p:nvPicPr>
+          <p:cNvPr id="4" name="Picture 3" descr="that1group-logo-white.jpg"/>
+          <p:cNvPicPr>
+            <a:picLocks noChangeAspect="1"/>
+          </p:cNvPicPr>
+          <p:nvPr/>
+        </p:nvPicPr>
+        <p:blipFill>
+          <a:blip r:embed="rId3">
+            <a:extLst>
+              <a:ext uri="{28A0092B-C50C-407E-A947-70E740481C1C}">
+                <a14:useLocalDpi xmlns:a14="http://schemas.microsoft.com/office/drawing/2010/main" val="0"/>
+              </a:ext>
+            </a:extLst>
+          </a:blip>
+          <a:stretch>
+            <a:fillRect/>
+          </a:stretch>
+        </p:blipFill>
+        <p:spPr>
+          <a:xfrm>
+            <a:off x="7366000" y="5715000"/>
+            <a:ext cx="1524000" cy="1143000"/>
+          </a:xfrm>
+          <a:prstGeom prst="rect">
+            <a:avLst/>
+          </a:prstGeom>
+        </p:spPr>
+      </p:pic>
+      <p:sp>
+        <p:nvSpPr>
+          <p:cNvPr id="7" name="TextBox 6"/>
+          <p:cNvSpPr txBox="1"/>
+          <p:nvPr/>
+        </p:nvSpPr>
+        <p:spPr>
+          <a:xfrm>
+            <a:off x="1905000" y="4876800"/>
+            <a:ext cx="5207000" cy="523220"/>
+          </a:xfrm>
+          <a:prstGeom prst="rect">
+            <a:avLst/>
+          </a:prstGeom>
+          <a:noFill/>
+        </p:spPr>
+        <p:txBody>
+          <a:bodyPr wrap="square" rtlCol="0">
+            <a:spAutoFit/>
+          </a:bodyPr>
+          <a:lstStyle/>
+          <a:p>
+            <a:r>
+              <a:rPr lang="en-US" sz="2800" dirty="0" smtClean="0"/>
+              <a:t>Your music, your map, your game!</a:t>
+            </a:r>
+            <a:endParaRPr lang="en-US" sz="2800" dirty="0"/>
+          </a:p>
+        </p:txBody>
+      </p:sp>
+    </p:spTree>
+    <p:extLst>
+      <p:ext uri="{BB962C8B-B14F-4D97-AF65-F5344CB8AC3E}">
+        <p14:creationId xmlns:p14="http://schemas.microsoft.com/office/powerpoint/2010/main" val="1229689061"/>
+      </p:ext>
+    </p:extLst>
+  </p:cSld>
+  <p:clrMapOvr>
+    <a:masterClrMapping/>
+  </p:clrMapOvr>
+</p:sld>
+</file>
+
+<file path=ppt/slides/slide3.xml><?xml version="1.0" encoding="utf-8"?>
+<p:sld xmlns:a="http://schemas.openxmlformats.org/drawingml/2006/main" xmlns:r="http://schemas.openxmlformats.org/officeDocument/2006/relationships" xmlns:p="http://schemas.openxmlformats.org/presentationml/2006/main">
+  <p:cSld>
+    <p:spTree>
+      <p:nvGrpSpPr>
+        <p:cNvPr id="1" name=""/>
+        <p:cNvGrpSpPr/>
+        <p:nvPr/>
+      </p:nvGrpSpPr>
+      <p:grpSpPr>
+        <a:xfrm>
+          <a:off x="0" y="0"/>
+          <a:ext cx="0" cy="0"/>
+          <a:chOff x="0" y="0"/>
+          <a:chExt cx="0" cy="0"/>
+        </a:xfrm>
+      </p:grpSpPr>
+      <p:sp>
+        <p:nvSpPr>
+          <p:cNvPr id="2" name="Title 1"/>
+          <p:cNvSpPr>
+            <a:spLocks noGrp="1"/>
+          </p:cNvSpPr>
+          <p:nvPr>
+            <p:ph type="title"/>
+          </p:nvPr>
+        </p:nvSpPr>
+        <p:spPr/>
+        <p:txBody>
           <a:bodyPr>
             <a:normAutofit/>
           </a:bodyPr>
@@ -4740,7 +4121,7 @@
           <a:p>
             <a:r>
               <a:rPr lang="en-US" dirty="0" smtClean="0"/>
-              <a:t>What’s on topic for today?</a:t>
+              <a:t>Agenda</a:t>
             </a:r>
             <a:endParaRPr lang="en-US" dirty="0"/>
           </a:p>
@@ -4768,59 +4149,74 @@
           </a:p>
           <a:p>
             <a:r>
+              <a:rPr lang="en-US" dirty="0" smtClean="0"/>
+              <a:t>Motivation for</a:t>
+            </a:r>
+            <a:r>
+              <a:rPr lang="en-US" dirty="0" smtClean="0"/>
+              <a:t> </a:t>
+            </a:r>
+            <a:r>
               <a:rPr lang="en-US" dirty="0"/>
-              <a:t>Social </a:t>
-            </a:r>
-            <a:r>
-              <a:rPr lang="en-US" dirty="0" smtClean="0"/>
-              <a:t>appeal </a:t>
+              <a:t>the </a:t>
+            </a:r>
+            <a:r>
+              <a:rPr lang="en-US" dirty="0" smtClean="0"/>
+              <a:t>game</a:t>
+            </a:r>
+          </a:p>
+          <a:p>
+            <a:r>
+              <a:rPr lang="en-US" dirty="0" smtClean="0"/>
+              <a:t>Background of the game</a:t>
+            </a:r>
+            <a:endParaRPr lang="en-US" dirty="0" smtClean="0"/>
+          </a:p>
+          <a:p>
+            <a:r>
+              <a:rPr lang="en-US" dirty="0" smtClean="0"/>
+              <a:t>About </a:t>
             </a:r>
             <a:r>
               <a:rPr lang="en-US" dirty="0"/>
-              <a:t>of the game</a:t>
-            </a:r>
-            <a:r>
-              <a:rPr lang="en-US" dirty="0" smtClean="0"/>
-              <a:t>.</a:t>
-            </a:r>
-          </a:p>
-          <a:p>
-            <a:r>
-              <a:rPr lang="en-US" dirty="0" smtClean="0"/>
-              <a:t>About </a:t>
-            </a:r>
-            <a:r>
-              <a:rPr lang="en-US" dirty="0"/>
-              <a:t>the final game</a:t>
-            </a:r>
-            <a:r>
-              <a:rPr lang="en-US" dirty="0" smtClean="0"/>
-              <a:t>.</a:t>
+              <a:t>the final </a:t>
+            </a:r>
+            <a:r>
+              <a:rPr lang="en-US" dirty="0" smtClean="0"/>
+              <a:t>game</a:t>
             </a:r>
             <a:endParaRPr lang="en-US" dirty="0" smtClean="0"/>
           </a:p>
           <a:p>
             <a:r>
               <a:rPr lang="en-US" dirty="0" smtClean="0"/>
-              <a:t>Status of game.</a:t>
+              <a:t>Status of </a:t>
+            </a:r>
+            <a:r>
+              <a:rPr lang="en-US" dirty="0" smtClean="0"/>
+              <a:t>game</a:t>
             </a:r>
             <a:endParaRPr lang="en-US" dirty="0" smtClean="0"/>
           </a:p>
           <a:p>
             <a:r>
               <a:rPr lang="en-US" dirty="0" smtClean="0"/>
-              <a:t>Test run of game</a:t>
-            </a:r>
-            <a:r>
-              <a:rPr lang="en-US" dirty="0" smtClean="0"/>
-              <a:t>.</a:t>
+              <a:t>Test run of </a:t>
+            </a:r>
+            <a:r>
+              <a:rPr lang="en-US" dirty="0" smtClean="0"/>
+              <a:t>game</a:t>
             </a:r>
             <a:endParaRPr lang="en-US" dirty="0" smtClean="0"/>
           </a:p>
           <a:p>
             <a:r>
               <a:rPr lang="en-US" dirty="0" smtClean="0"/>
-              <a:t>Closing remarks.</a:t>
+              <a:t>Closing </a:t>
+            </a:r>
+            <a:r>
+              <a:rPr lang="en-US" dirty="0" smtClean="0"/>
+              <a:t>remarks</a:t>
             </a:r>
             <a:endParaRPr lang="en-US" dirty="0"/>
           </a:p>
@@ -4876,7 +4272,7 @@
 </p:sld>
 </file>
 
-<file path=ppt/slides/slide3.xml><?xml version="1.0" encoding="utf-8"?>
+<file path=ppt/slides/slide4.xml><?xml version="1.0" encoding="utf-8"?>
 <p:sld xmlns:a="http://schemas.openxmlformats.org/drawingml/2006/main" xmlns:r="http://schemas.openxmlformats.org/officeDocument/2006/relationships" xmlns:p="http://schemas.openxmlformats.org/presentationml/2006/main">
   <p:cSld>
     <p:spTree>
@@ -4910,7 +4306,11 @@
           <a:p>
             <a:r>
               <a:rPr lang="en-US" dirty="0" smtClean="0"/>
-              <a:t>Why The Great Audio Race?</a:t>
+              <a:t>How </a:t>
+            </a:r>
+            <a:r>
+              <a:rPr lang="en-US" dirty="0" smtClean="0"/>
+              <a:t>it Began</a:t>
             </a:r>
             <a:endParaRPr lang="en-US" dirty="0"/>
           </a:p>
@@ -4933,20 +4333,28 @@
           <a:p>
             <a:r>
               <a:rPr lang="en-US" dirty="0" smtClean="0"/>
-              <a:t>Relevance to Autism Spectrum Disorder.</a:t>
-            </a:r>
-          </a:p>
-          <a:p>
-            <a:r>
-              <a:rPr lang="en-US" dirty="0" smtClean="0"/>
-              <a:t>Reaction to multiple stimuli.</a:t>
-            </a:r>
-          </a:p>
-          <a:p>
-            <a:r>
-              <a:rPr lang="en-US" dirty="0" smtClean="0"/>
-              <a:t>Reason why the game is prevalent.</a:t>
-            </a:r>
+              <a:t>Motivation for the game</a:t>
+            </a:r>
+          </a:p>
+          <a:p>
+            <a:r>
+              <a:rPr lang="en-US" dirty="0" smtClean="0"/>
+              <a:t>Criteria for the game</a:t>
+            </a:r>
+          </a:p>
+          <a:p>
+            <a:r>
+              <a:rPr lang="en-US" dirty="0" smtClean="0"/>
+              <a:t>Relevance to ASD of the game</a:t>
+            </a:r>
+            <a:endParaRPr lang="en-US" dirty="0" smtClean="0"/>
+          </a:p>
+          <a:p>
+            <a:r>
+              <a:rPr lang="en-US" dirty="0" smtClean="0"/>
+              <a:t>Marketability of game</a:t>
+            </a:r>
+            <a:endParaRPr lang="en-US" dirty="0" smtClean="0"/>
           </a:p>
           <a:p>
             <a:endParaRPr lang="en-US" dirty="0" smtClean="0"/>
@@ -5015,7 +4423,7 @@
 </p:sld>
 </file>
 
-<file path=ppt/slides/slide4.xml><?xml version="1.0" encoding="utf-8"?>
+<file path=ppt/slides/slide5.xml><?xml version="1.0" encoding="utf-8"?>
 <p:sld xmlns:a="http://schemas.openxmlformats.org/drawingml/2006/main" xmlns:r="http://schemas.openxmlformats.org/officeDocument/2006/relationships" xmlns:p="http://schemas.openxmlformats.org/presentationml/2006/main">
   <p:cSld>
     <p:spTree>
@@ -5049,7 +4457,15 @@
           <a:p>
             <a:r>
               <a:rPr lang="en-US" dirty="0" smtClean="0"/>
-              <a:t>What is The Great Audio Race?</a:t>
+              <a:t>The Idea </a:t>
+            </a:r>
+            <a:r>
+              <a:rPr lang="en-US" dirty="0"/>
+              <a:t>B</a:t>
+            </a:r>
+            <a:r>
+              <a:rPr lang="en-US" dirty="0" smtClean="0"/>
+              <a:t>ehind it</a:t>
             </a:r>
             <a:endParaRPr lang="en-US" dirty="0"/>
           </a:p>
@@ -5072,26 +4488,39 @@
           <a:p>
             <a:r>
               <a:rPr lang="en-US" dirty="0" smtClean="0"/>
-              <a:t>User racing through space.</a:t>
-            </a:r>
-          </a:p>
-          <a:p>
-            <a:r>
-              <a:rPr lang="en-US" dirty="0" smtClean="0"/>
-              <a:t>User dodging obstacles.</a:t>
-            </a:r>
-          </a:p>
-          <a:p>
-            <a:r>
-              <a:rPr lang="en-US" dirty="0" smtClean="0"/>
-              <a:t>User reacting to multiple stimuli.</a:t>
-            </a:r>
-          </a:p>
-          <a:p>
-            <a:r>
-              <a:rPr lang="en-US" dirty="0" smtClean="0"/>
-              <a:t>User collects rewards throughout level.</a:t>
-            </a:r>
+              <a:t>Game is based entirely on customization</a:t>
+            </a:r>
+          </a:p>
+          <a:p>
+            <a:r>
+              <a:rPr lang="en-US" dirty="0" smtClean="0"/>
+              <a:t>Game targets an older audience</a:t>
+            </a:r>
+          </a:p>
+          <a:p>
+            <a:r>
+              <a:rPr lang="en-US" dirty="0" smtClean="0"/>
+              <a:t>Games helps reacting to multiple stimuli</a:t>
+            </a:r>
+          </a:p>
+          <a:p>
+            <a:r>
+              <a:rPr lang="en-US" dirty="0" smtClean="0"/>
+              <a:t>Game gives rewards based on performance</a:t>
+            </a:r>
+          </a:p>
+          <a:p>
+            <a:endParaRPr lang="en-US" dirty="0"/>
+          </a:p>
+          <a:p>
+            <a:r>
+              <a:rPr lang="en-US" dirty="0" smtClean="0"/>
+              <a:t>(insert photo or selecting music file)</a:t>
+            </a:r>
+            <a:endParaRPr lang="en-US" dirty="0" smtClean="0"/>
+          </a:p>
+          <a:p>
+            <a:endParaRPr lang="en-US" dirty="0" smtClean="0"/>
           </a:p>
           <a:p>
             <a:endParaRPr lang="en-US" dirty="0" smtClean="0"/>
@@ -5150,7 +4579,7 @@
 </p:sld>
 </file>
 
-<file path=ppt/slides/slide5.xml><?xml version="1.0" encoding="utf-8"?>
+<file path=ppt/slides/slide6.xml><?xml version="1.0" encoding="utf-8"?>
 <p:sld xmlns:a="http://schemas.openxmlformats.org/drawingml/2006/main" xmlns:r="http://schemas.openxmlformats.org/officeDocument/2006/relationships" xmlns:p="http://schemas.openxmlformats.org/presentationml/2006/main">
   <p:cSld>
     <p:spTree>
@@ -5182,7 +4611,63 @@
           <a:bodyPr/>
           <a:lstStyle/>
           <a:p>
+            <a:r>
+              <a:rPr lang="en-US" dirty="0" smtClean="0"/>
+              <a:t>What it Really is</a:t>
+            </a:r>
             <a:endParaRPr lang="en-US" dirty="0"/>
+          </a:p>
+        </p:txBody>
+      </p:sp>
+      <p:sp>
+        <p:nvSpPr>
+          <p:cNvPr id="3" name="Content Placeholder 2"/>
+          <p:cNvSpPr>
+            <a:spLocks noGrp="1"/>
+          </p:cNvSpPr>
+          <p:nvPr>
+            <p:ph idx="1"/>
+          </p:nvPr>
+        </p:nvSpPr>
+        <p:spPr/>
+        <p:txBody>
+          <a:bodyPr/>
+          <a:lstStyle/>
+          <a:p>
+            <a:r>
+              <a:rPr lang="en-US" dirty="0" smtClean="0"/>
+              <a:t>User trying to race themselves</a:t>
+            </a:r>
+          </a:p>
+          <a:p>
+            <a:r>
+              <a:rPr lang="en-US" dirty="0" smtClean="0"/>
+              <a:t>User dodging obstacles</a:t>
+            </a:r>
+          </a:p>
+          <a:p>
+            <a:r>
+              <a:rPr lang="en-US" dirty="0" smtClean="0"/>
+              <a:t>User collecting coins to earn points</a:t>
+            </a:r>
+          </a:p>
+          <a:p>
+            <a:r>
+              <a:rPr lang="en-US" dirty="0" smtClean="0"/>
+              <a:t>User breaking new records</a:t>
+            </a:r>
+          </a:p>
+          <a:p>
+            <a:r>
+              <a:rPr lang="en-US" dirty="0" smtClean="0"/>
+              <a:t>User overcoming social inabilities</a:t>
+            </a:r>
+          </a:p>
+          <a:p>
+            <a:r>
+              <a:rPr lang="en-US" dirty="0" smtClean="0"/>
+              <a:t>User becoming more than just a user</a:t>
+            </a:r>
           </a:p>
         </p:txBody>
       </p:sp>
@@ -5216,105 +4701,20 @@
           </a:prstGeom>
         </p:spPr>
       </p:pic>
-      <p:pic>
-        <p:nvPicPr>
-          <p:cNvPr id="9" name="Content Placeholder 8" descr="high scores menu.png"/>
-          <p:cNvPicPr>
-            <a:picLocks noGrp="1" noChangeAspect="1"/>
-          </p:cNvPicPr>
-          <p:nvPr>
-            <p:ph idx="1"/>
-          </p:nvPr>
-        </p:nvPicPr>
-        <p:blipFill>
-          <a:blip r:embed="rId3">
-            <a:extLst>
-              <a:ext uri="{28A0092B-C50C-407E-A947-70E740481C1C}">
-                <a14:useLocalDpi xmlns:a14="http://schemas.microsoft.com/office/drawing/2010/main" val="0"/>
-              </a:ext>
-            </a:extLst>
-          </a:blip>
-          <a:srcRect t="7574" b="7574"/>
-          <a:stretch>
-            <a:fillRect/>
-          </a:stretch>
-        </p:blipFill>
-        <p:spPr>
-          <a:xfrm>
-            <a:off x="4495800" y="304800"/>
-            <a:ext cx="4343400" cy="2819400"/>
-          </a:xfrm>
-        </p:spPr>
-      </p:pic>
-      <p:pic>
-        <p:nvPicPr>
-          <p:cNvPr id="7" name="Picture 6"/>
-          <p:cNvPicPr>
-            <a:picLocks noChangeAspect="1"/>
-          </p:cNvPicPr>
-          <p:nvPr/>
-        </p:nvPicPr>
-        <p:blipFill>
-          <a:blip r:embed="rId4"/>
-          <a:stretch>
-            <a:fillRect/>
-          </a:stretch>
-        </p:blipFill>
-        <p:spPr>
-          <a:xfrm>
-            <a:off x="2667000" y="3505200"/>
-            <a:ext cx="4343399" cy="2862785"/>
-          </a:xfrm>
-          <a:prstGeom prst="rect">
-            <a:avLst/>
-          </a:prstGeom>
-        </p:spPr>
-      </p:pic>
-      <p:pic>
-        <p:nvPicPr>
-          <p:cNvPr id="8" name="Picture 7"/>
-          <p:cNvPicPr>
-            <a:picLocks noChangeAspect="1"/>
-          </p:cNvPicPr>
-          <p:nvPr/>
-        </p:nvPicPr>
-        <p:blipFill>
-          <a:blip r:embed="rId5"/>
-          <a:stretch>
-            <a:fillRect/>
-          </a:stretch>
-        </p:blipFill>
-        <p:spPr>
-          <a:xfrm>
-            <a:off x="228600" y="228600"/>
-            <a:ext cx="4191000" cy="3020353"/>
-          </a:xfrm>
-          <a:prstGeom prst="rect">
-            <a:avLst/>
-          </a:prstGeom>
-        </p:spPr>
-      </p:pic>
     </p:spTree>
     <p:extLst>
       <p:ext uri="{BB962C8B-B14F-4D97-AF65-F5344CB8AC3E}">
-        <p14:creationId xmlns:p14="http://schemas.microsoft.com/office/powerpoint/2010/main" val="836905932"/>
+        <p14:creationId xmlns:p14="http://schemas.microsoft.com/office/powerpoint/2010/main" val="3221253158"/>
       </p:ext>
     </p:extLst>
   </p:cSld>
   <p:clrMapOvr>
     <a:masterClrMapping/>
   </p:clrMapOvr>
-  <p:timing>
-    <p:tnLst>
-      <p:par>
-        <p:cTn xmlns:p14="http://schemas.microsoft.com/office/powerpoint/2010/main" id="1" dur="indefinite" restart="never" nodeType="tmRoot"/>
-      </p:par>
-    </p:tnLst>
-  </p:timing>
 </p:sld>
 </file>
 
-<file path=ppt/slides/slide6.xml><?xml version="1.0" encoding="utf-8"?>
+<file path=ppt/slides/slide7.xml><?xml version="1.0" encoding="utf-8"?>
 <p:sld xmlns:a="http://schemas.openxmlformats.org/drawingml/2006/main" xmlns:r="http://schemas.openxmlformats.org/officeDocument/2006/relationships" xmlns:p="http://schemas.openxmlformats.org/presentationml/2006/main">
   <p:cSld>
     <p:spTree>
@@ -5350,7 +4750,15 @@
           <a:p>
             <a:r>
               <a:rPr lang="en-US" sz="3600" dirty="0" smtClean="0"/>
-              <a:t>How’d we create The Great Audio Race?</a:t>
+              <a:t>How it Really </a:t>
+            </a:r>
+            <a:r>
+              <a:rPr lang="en-US" sz="3600" dirty="0"/>
+              <a:t>W</a:t>
+            </a:r>
+            <a:r>
+              <a:rPr lang="en-US" sz="3600" dirty="0" smtClean="0"/>
+              <a:t>orks</a:t>
             </a:r>
             <a:endParaRPr lang="en-US" sz="3600" dirty="0"/>
           </a:p>
@@ -5508,11 +4916,7 @@
             </a:r>
             <a:r>
               <a:rPr lang="en-US" sz="2400" dirty="0"/>
-              <a:t> </a:t>
-            </a:r>
-            <a:r>
-              <a:rPr lang="en-US" sz="2400" dirty="0"/>
-              <a:t>∫f(t)</a:t>
+              <a:t> ∫f(t)</a:t>
             </a:r>
             <a:r>
               <a:rPr lang="en-US" sz="2400" dirty="0" err="1"/>
@@ -5603,7 +5007,7 @@
 </p:sld>
 </file>
 
-<file path=ppt/slides/slide7.xml><?xml version="1.0" encoding="utf-8"?>
+<file path=ppt/slides/slide8.xml><?xml version="1.0" encoding="utf-8"?>
 <p:sld xmlns:a="http://schemas.openxmlformats.org/drawingml/2006/main" xmlns:r="http://schemas.openxmlformats.org/officeDocument/2006/relationships" xmlns:p="http://schemas.openxmlformats.org/presentationml/2006/main">
   <p:cSld>
     <p:spTree>
@@ -5633,64 +5037,66 @@
         <p:spPr/>
         <p:txBody>
           <a:bodyPr>
-            <a:normAutofit fontScale="90000"/>
+            <a:normAutofit/>
           </a:bodyPr>
           <a:lstStyle/>
           <a:p>
             <a:r>
-              <a:rPr lang="en-US" dirty="0" smtClean="0"/>
-              <a:t>How does The Great Audio Race work?</a:t>
+              <a:rPr lang="en-US" sz="3600" dirty="0" smtClean="0"/>
+              <a:t>Design</a:t>
+            </a:r>
+            <a:r>
+              <a:rPr lang="en-US" sz="3600" dirty="0" smtClean="0"/>
+              <a:t> of the Game</a:t>
+            </a:r>
+            <a:endParaRPr lang="en-US" sz="3600" dirty="0"/>
+          </a:p>
+        </p:txBody>
+      </p:sp>
+      <p:sp>
+        <p:nvSpPr>
+          <p:cNvPr id="3" name="Content Placeholder 2"/>
+          <p:cNvSpPr>
+            <a:spLocks noGrp="1"/>
+          </p:cNvSpPr>
+          <p:nvPr>
+            <p:ph idx="1"/>
+          </p:nvPr>
+        </p:nvSpPr>
+        <p:spPr/>
+        <p:txBody>
+          <a:bodyPr/>
+          <a:lstStyle/>
+          <a:p>
+            <a:r>
+              <a:rPr lang="en-US" dirty="0" smtClean="0"/>
+              <a:t>Use of </a:t>
+            </a:r>
+            <a:r>
+              <a:rPr lang="en-US" dirty="0" err="1" smtClean="0"/>
+              <a:t>Autocad</a:t>
+            </a:r>
+            <a:r>
+              <a:rPr lang="en-US" dirty="0" smtClean="0"/>
+              <a:t> for sprite creation.</a:t>
+            </a:r>
+          </a:p>
+          <a:p>
+            <a:r>
+              <a:rPr lang="en-US" dirty="0" smtClean="0"/>
+              <a:t>Use of Seashore for image editing.</a:t>
+            </a:r>
+          </a:p>
+          <a:p>
+            <a:r>
+              <a:rPr lang="en-US" dirty="0" smtClean="0"/>
+              <a:t>Use of GIMP to finalize images</a:t>
+            </a:r>
+            <a:r>
+              <a:rPr lang="en-US" dirty="0" smtClean="0"/>
+              <a:t>.</a:t>
             </a:r>
             <a:endParaRPr lang="en-US" dirty="0"/>
-          </a:p>
-        </p:txBody>
-      </p:sp>
-      <p:sp>
-        <p:nvSpPr>
-          <p:cNvPr id="3" name="Content Placeholder 2"/>
-          <p:cNvSpPr>
-            <a:spLocks noGrp="1"/>
-          </p:cNvSpPr>
-          <p:nvPr>
-            <p:ph idx="1"/>
-          </p:nvPr>
-        </p:nvSpPr>
-        <p:spPr/>
-        <p:txBody>
-          <a:bodyPr/>
-          <a:lstStyle/>
-          <a:p>
-            <a:r>
-              <a:rPr lang="en-US" dirty="0" smtClean="0"/>
-              <a:t>Collision with a group of sprites.</a:t>
-            </a:r>
-          </a:p>
-          <a:p>
-            <a:r>
-              <a:rPr lang="en-US" dirty="0" smtClean="0"/>
-              <a:t>Creation of multiple difficulty levels.</a:t>
-            </a:r>
-          </a:p>
-          <a:p>
-            <a:r>
-              <a:rPr lang="en-US" dirty="0" smtClean="0"/>
-              <a:t>Generate obstacles based on frequency.</a:t>
-            </a:r>
-          </a:p>
-          <a:p>
-            <a:r>
-              <a:rPr lang="en-US" dirty="0"/>
-              <a:t>Implementation of the algorithm.</a:t>
-            </a:r>
-          </a:p>
-          <a:p>
-            <a:endParaRPr lang="en-US" dirty="0" smtClean="0"/>
-          </a:p>
-          <a:p>
-            <a:endParaRPr lang="en-US" dirty="0" smtClean="0"/>
-          </a:p>
-          <a:p>
-            <a:endParaRPr lang="en-US" dirty="0" smtClean="0"/>
           </a:p>
           <a:p>
             <a:endParaRPr lang="en-US" dirty="0"/>
@@ -5699,7 +5105,7 @@
       </p:sp>
       <p:pic>
         <p:nvPicPr>
-          <p:cNvPr id="4" name="Picture 3" descr="that1group-logo-white.jpg"/>
+          <p:cNvPr id="5" name="Picture 4" descr="that1group-logo-white.jpg"/>
           <p:cNvPicPr>
             <a:picLocks noChangeAspect="1"/>
           </p:cNvPicPr>
@@ -5727,135 +5133,24 @@
           </a:prstGeom>
         </p:spPr>
       </p:pic>
-    </p:spTree>
-    <p:extLst>
-      <p:ext uri="{BB962C8B-B14F-4D97-AF65-F5344CB8AC3E}">
-        <p14:creationId xmlns:p14="http://schemas.microsoft.com/office/powerpoint/2010/main" val="2239025468"/>
-      </p:ext>
-    </p:extLst>
-  </p:cSld>
-  <p:clrMapOvr>
-    <a:masterClrMapping/>
-  </p:clrMapOvr>
-  <p:timing>
-    <p:tnLst>
-      <p:par>
-        <p:cTn xmlns:p14="http://schemas.microsoft.com/office/powerpoint/2010/main" id="1" dur="indefinite" restart="never" nodeType="tmRoot"/>
-      </p:par>
-    </p:tnLst>
-  </p:timing>
-</p:sld>
-</file>
-
-<file path=ppt/slides/slide8.xml><?xml version="1.0" encoding="utf-8"?>
-<p:sld xmlns:a="http://schemas.openxmlformats.org/drawingml/2006/main" xmlns:r="http://schemas.openxmlformats.org/officeDocument/2006/relationships" xmlns:p="http://schemas.openxmlformats.org/presentationml/2006/main">
-  <p:cSld>
-    <p:spTree>
-      <p:nvGrpSpPr>
-        <p:cNvPr id="1" name=""/>
-        <p:cNvGrpSpPr/>
-        <p:nvPr/>
-      </p:nvGrpSpPr>
-      <p:grpSpPr>
-        <a:xfrm>
-          <a:off x="0" y="0"/>
-          <a:ext cx="0" cy="0"/>
-          <a:chOff x="0" y="0"/>
-          <a:chExt cx="0" cy="0"/>
-        </a:xfrm>
-      </p:grpSpPr>
-      <p:sp>
-        <p:nvSpPr>
-          <p:cNvPr id="2" name="Title 1"/>
-          <p:cNvSpPr>
-            <a:spLocks noGrp="1"/>
-          </p:cNvSpPr>
-          <p:nvPr>
-            <p:ph type="title"/>
-          </p:nvPr>
-        </p:nvSpPr>
-        <p:spPr/>
-        <p:txBody>
-          <a:bodyPr>
-            <a:normAutofit/>
-          </a:bodyPr>
-          <a:lstStyle/>
-          <a:p>
-            <a:r>
-              <a:rPr lang="en-US" sz="3600" dirty="0" smtClean="0"/>
-              <a:t>How was The Great Audio Race Designed?</a:t>
-            </a:r>
-            <a:endParaRPr lang="en-US" sz="3600" dirty="0"/>
-          </a:p>
-        </p:txBody>
-      </p:sp>
-      <p:sp>
-        <p:nvSpPr>
-          <p:cNvPr id="3" name="Content Placeholder 2"/>
-          <p:cNvSpPr>
-            <a:spLocks noGrp="1"/>
-          </p:cNvSpPr>
-          <p:nvPr>
-            <p:ph idx="1"/>
-          </p:nvPr>
-        </p:nvSpPr>
-        <p:spPr/>
-        <p:txBody>
-          <a:bodyPr/>
-          <a:lstStyle/>
-          <a:p>
-            <a:r>
-              <a:rPr lang="en-US" dirty="0" smtClean="0"/>
-              <a:t>Use of </a:t>
-            </a:r>
-            <a:r>
-              <a:rPr lang="en-US" dirty="0" err="1" smtClean="0"/>
-              <a:t>Autocad</a:t>
-            </a:r>
-            <a:r>
-              <a:rPr lang="en-US" dirty="0" smtClean="0"/>
-              <a:t> for sprite creation.</a:t>
-            </a:r>
-          </a:p>
-          <a:p>
-            <a:r>
-              <a:rPr lang="en-US" dirty="0" smtClean="0"/>
-              <a:t>Use of Seashore for image editing.</a:t>
-            </a:r>
-          </a:p>
-          <a:p>
-            <a:r>
-              <a:rPr lang="en-US" dirty="0" smtClean="0"/>
-              <a:t>Use of GIMP to finalize images.</a:t>
-            </a:r>
-            <a:endParaRPr lang="en-US" dirty="0"/>
-          </a:p>
-        </p:txBody>
-      </p:sp>
       <p:pic>
         <p:nvPicPr>
-          <p:cNvPr id="5" name="Picture 4" descr="that1group-logo-white.jpg"/>
+          <p:cNvPr id="6" name="Picture 5"/>
           <p:cNvPicPr>
             <a:picLocks noChangeAspect="1"/>
           </p:cNvPicPr>
           <p:nvPr/>
         </p:nvPicPr>
         <p:blipFill>
-          <a:blip r:embed="rId2">
-            <a:extLst>
-              <a:ext uri="{28A0092B-C50C-407E-A947-70E740481C1C}">
-                <a14:useLocalDpi xmlns:a14="http://schemas.microsoft.com/office/drawing/2010/main" val="0"/>
-              </a:ext>
-            </a:extLst>
-          </a:blip>
+          <a:blip r:embed="rId3"/>
           <a:stretch>
             <a:fillRect/>
           </a:stretch>
         </p:blipFill>
         <p:spPr>
           <a:xfrm>
-            <a:off x="7366000" y="5715000"/>
-            <a:ext cx="1524000" cy="1143000"/>
+            <a:off x="2286000" y="3429000"/>
+            <a:ext cx="4343399" cy="2862785"/>
           </a:xfrm>
           <a:prstGeom prst="rect">
             <a:avLst/>
@@ -5911,16 +5206,22 @@
         </p:nvSpPr>
         <p:spPr/>
         <p:txBody>
-          <a:bodyPr>
-            <a:noAutofit/>
-          </a:bodyPr>
-          <a:lstStyle/>
-          <a:p>
-            <a:r>
-              <a:rPr lang="en-US" sz="3500" dirty="0" smtClean="0"/>
-              <a:t>What’re the tasks for The Great Audio Race?</a:t>
-            </a:r>
-            <a:endParaRPr lang="en-US" sz="3500" dirty="0"/>
+          <a:bodyPr/>
+          <a:lstStyle/>
+          <a:p>
+            <a:r>
+              <a:rPr lang="en-US" dirty="0" smtClean="0"/>
+              <a:t>Customization to the Next </a:t>
+            </a:r>
+            <a:r>
+              <a:rPr lang="en-US" dirty="0"/>
+              <a:t>L</a:t>
+            </a:r>
+            <a:r>
+              <a:rPr lang="en-US" dirty="0" smtClean="0"/>
+              <a:t>evel</a:t>
+            </a:r>
+            <a:endParaRPr lang="en-US" dirty="0"/>
           </a:p>
         </p:txBody>
       </p:sp>
@@ -5936,79 +5237,22 @@
         </p:nvSpPr>
         <p:spPr/>
         <p:txBody>
-          <a:bodyPr>
-            <a:normAutofit/>
-          </a:bodyPr>
-          <a:lstStyle/>
-          <a:p>
-            <a:r>
-              <a:rPr lang="en-US" dirty="0"/>
-              <a:t>Collect </a:t>
-            </a:r>
-            <a:r>
-              <a:rPr lang="en-US" dirty="0" smtClean="0"/>
-              <a:t>data and analyze frequency.</a:t>
-            </a:r>
-          </a:p>
-          <a:p>
-            <a:r>
-              <a:rPr lang="en-US" dirty="0" smtClean="0"/>
-              <a:t>Create </a:t>
-            </a:r>
-            <a:r>
-              <a:rPr lang="en-US" dirty="0"/>
-              <a:t>i</a:t>
-            </a:r>
-            <a:r>
-              <a:rPr lang="en-US" dirty="0" smtClean="0"/>
-              <a:t>nitial </a:t>
-            </a:r>
-            <a:r>
-              <a:rPr lang="en-US" dirty="0"/>
-              <a:t>g</a:t>
-            </a:r>
-            <a:r>
-              <a:rPr lang="en-US" dirty="0" smtClean="0"/>
-              <a:t>ame </a:t>
-            </a:r>
-            <a:r>
-              <a:rPr lang="en-US" dirty="0"/>
-              <a:t>m</a:t>
-            </a:r>
-            <a:r>
-              <a:rPr lang="en-US" dirty="0" smtClean="0"/>
-              <a:t>enus.</a:t>
-            </a:r>
-          </a:p>
-          <a:p>
-            <a:r>
-              <a:rPr lang="en-US" dirty="0" smtClean="0"/>
-              <a:t>Map sprites to respond to input.</a:t>
-            </a:r>
-          </a:p>
-          <a:p>
-            <a:r>
-              <a:rPr lang="en-US" dirty="0" smtClean="0"/>
-              <a:t>Create skeleton of first few levels.</a:t>
-            </a:r>
-          </a:p>
-          <a:p>
-            <a:r>
-              <a:rPr lang="en-US" dirty="0" smtClean="0"/>
-              <a:t>Have basic collision detection.</a:t>
-            </a:r>
-          </a:p>
-          <a:p>
-            <a:r>
-              <a:rPr lang="en-US" dirty="0" smtClean="0"/>
-              <a:t>Add major features.</a:t>
-            </a:r>
-          </a:p>
-          <a:p>
-            <a:r>
-              <a:rPr lang="en-US" dirty="0" smtClean="0"/>
-              <a:t>Debug code by testing.</a:t>
-            </a:r>
+          <a:bodyPr/>
+          <a:lstStyle/>
+          <a:p>
+            <a:r>
+              <a:rPr lang="en-US" dirty="0" smtClean="0"/>
+              <a:t>(photo of the song choice [maybe of two </a:t>
+            </a:r>
+            <a:r>
+              <a:rPr lang="en-US" dirty="0" err="1" smtClean="0"/>
+              <a:t>differenent</a:t>
+            </a:r>
+            <a:r>
+              <a:rPr lang="en-US" dirty="0" smtClean="0"/>
+              <a:t> songs being played])</a:t>
+            </a:r>
+            <a:endParaRPr lang="en-US" dirty="0"/>
           </a:p>
         </p:txBody>
       </p:sp>
@@ -6045,20 +5289,13 @@
     </p:spTree>
     <p:extLst>
       <p:ext uri="{BB962C8B-B14F-4D97-AF65-F5344CB8AC3E}">
-        <p14:creationId xmlns:p14="http://schemas.microsoft.com/office/powerpoint/2010/main" val="1554782554"/>
+        <p14:creationId xmlns:p14="http://schemas.microsoft.com/office/powerpoint/2010/main" val="4213070227"/>
       </p:ext>
     </p:extLst>
   </p:cSld>
   <p:clrMapOvr>
     <a:masterClrMapping/>
   </p:clrMapOvr>
-  <p:timing>
-    <p:tnLst>
-      <p:par>
-        <p:cTn xmlns:p14="http://schemas.microsoft.com/office/powerpoint/2010/main" id="1" dur="indefinite" restart="never" nodeType="tmRoot"/>
-      </p:par>
-    </p:tnLst>
-  </p:timing>
 </p:sld>
 </file>
 

</xml_diff>

<commit_message>
Add new main menu
</commit_message>
<xml_diff>
--- a/presenationTWO.pptx
+++ b/presenationTWO.pptx
@@ -3317,8 +3317,27 @@
           <a:p>
             <a:r>
               <a:rPr lang="en-US" dirty="0" smtClean="0"/>
-              <a:t>(Discuss the rewards system)</a:t>
-            </a:r>
+              <a:t>Points for precision</a:t>
+            </a:r>
+          </a:p>
+          <a:p>
+            <a:r>
+              <a:rPr lang="en-US" dirty="0" smtClean="0"/>
+              <a:t>Points for speed</a:t>
+            </a:r>
+          </a:p>
+          <a:p>
+            <a:r>
+              <a:rPr lang="en-US" dirty="0" smtClean="0"/>
+              <a:t>Points for time</a:t>
+            </a:r>
+          </a:p>
+          <a:p>
+            <a:r>
+              <a:rPr lang="en-US" dirty="0" smtClean="0"/>
+              <a:t>Points add up, and so do high scores</a:t>
+            </a:r>
+            <a:endParaRPr lang="en-US" dirty="0" smtClean="0"/>
           </a:p>
           <a:p>
             <a:r>
@@ -3528,6 +3547,37 @@
         <p:txBody>
           <a:bodyPr/>
           <a:lstStyle/>
+          <a:p>
+            <a:r>
+              <a:rPr lang="en-US" dirty="0" smtClean="0"/>
+              <a:t>Motivation of game</a:t>
+            </a:r>
+          </a:p>
+          <a:p>
+            <a:r>
+              <a:rPr lang="en-US" dirty="0" smtClean="0"/>
+              <a:t>Background of game</a:t>
+            </a:r>
+          </a:p>
+          <a:p>
+            <a:r>
+              <a:rPr lang="en-US" dirty="0" smtClean="0"/>
+              <a:t>Complete overview of game</a:t>
+            </a:r>
+          </a:p>
+          <a:p>
+            <a:r>
+              <a:rPr lang="en-US" dirty="0" smtClean="0"/>
+              <a:t>Customization of game</a:t>
+            </a:r>
+          </a:p>
+          <a:p>
+            <a:r>
+              <a:rPr lang="en-US" dirty="0" smtClean="0"/>
+              <a:t>Rewards of game</a:t>
+            </a:r>
+            <a:endParaRPr lang="en-US" dirty="0" smtClean="0"/>
+          </a:p>
           <a:p>
             <a:endParaRPr lang="en-US" dirty="0" smtClean="0"/>
           </a:p>
@@ -3617,11 +3667,7 @@
           <a:p>
             <a:r>
               <a:rPr lang="en-US" dirty="0" smtClean="0"/>
-              <a:t>Contact </a:t>
-            </a:r>
-            <a:r>
-              <a:rPr lang="en-US" dirty="0" smtClean="0"/>
-              <a:t>Us</a:t>
+              <a:t>Contact Us</a:t>
             </a:r>
             <a:endParaRPr lang="en-US" dirty="0"/>
           </a:p>
@@ -4143,7 +4189,9 @@
         </p:nvSpPr>
         <p:spPr/>
         <p:txBody>
-          <a:bodyPr/>
+          <a:bodyPr>
+            <a:normAutofit lnSpcReduction="10000"/>
+          </a:bodyPr>
           <a:lstStyle/>
           <a:p>
             <a:pPr marL="0" indent="0" algn="ctr">
@@ -4154,11 +4202,7 @@
           <a:p>
             <a:r>
               <a:rPr lang="en-US" dirty="0" smtClean="0"/>
-              <a:t>Motivation for</a:t>
-            </a:r>
-            <a:r>
-              <a:rPr lang="en-US" dirty="0" smtClean="0"/>
-              <a:t> </a:t>
+              <a:t>Motivation for </a:t>
             </a:r>
             <a:r>
               <a:rPr lang="en-US" dirty="0"/>
@@ -4174,53 +4218,34 @@
               <a:rPr lang="en-US" dirty="0" smtClean="0"/>
               <a:t>Background of the game</a:t>
             </a:r>
+          </a:p>
+          <a:p>
+            <a:r>
+              <a:rPr lang="en-US" dirty="0" smtClean="0"/>
+              <a:t>Overview of game</a:t>
+            </a:r>
             <a:endParaRPr lang="en-US" dirty="0" smtClean="0"/>
           </a:p>
           <a:p>
             <a:r>
               <a:rPr lang="en-US" dirty="0" smtClean="0"/>
-              <a:t>About </a:t>
-            </a:r>
-            <a:r>
-              <a:rPr lang="en-US" dirty="0"/>
-              <a:t>the final </a:t>
-            </a:r>
-            <a:r>
-              <a:rPr lang="en-US" dirty="0" smtClean="0"/>
-              <a:t>game</a:t>
+              <a:t>Customization of game</a:t>
             </a:r>
             <a:endParaRPr lang="en-US" dirty="0" smtClean="0"/>
           </a:p>
           <a:p>
             <a:r>
               <a:rPr lang="en-US" dirty="0" smtClean="0"/>
-              <a:t>Status of </a:t>
-            </a:r>
-            <a:r>
-              <a:rPr lang="en-US" dirty="0" smtClean="0"/>
-              <a:t>game</a:t>
-            </a:r>
+              <a:t>Rewards of game</a:t>
+            </a:r>
+          </a:p>
+          <a:p>
             <a:endParaRPr lang="en-US" dirty="0" smtClean="0"/>
           </a:p>
           <a:p>
             <a:r>
               <a:rPr lang="en-US" dirty="0" smtClean="0"/>
-              <a:t>Test run of </a:t>
-            </a:r>
-            <a:r>
-              <a:rPr lang="en-US" dirty="0" smtClean="0"/>
-              <a:t>game</a:t>
-            </a:r>
-            <a:endParaRPr lang="en-US" dirty="0" smtClean="0"/>
-          </a:p>
-          <a:p>
-            <a:r>
-              <a:rPr lang="en-US" dirty="0" smtClean="0"/>
-              <a:t>Closing </a:t>
-            </a:r>
-            <a:r>
-              <a:rPr lang="en-US" dirty="0" smtClean="0"/>
-              <a:t>remarks</a:t>
+              <a:t>Closing remarks</a:t>
             </a:r>
             <a:endParaRPr lang="en-US" dirty="0"/>
           </a:p>
@@ -4310,11 +4335,7 @@
           <a:p>
             <a:r>
               <a:rPr lang="en-US" dirty="0" smtClean="0"/>
-              <a:t>How </a:t>
-            </a:r>
-            <a:r>
-              <a:rPr lang="en-US" dirty="0" smtClean="0"/>
-              <a:t>it Began</a:t>
+              <a:t>How it Began</a:t>
             </a:r>
             <a:endParaRPr lang="en-US" dirty="0"/>
           </a:p>
@@ -4351,14 +4372,12 @@
               <a:rPr lang="en-US" dirty="0" smtClean="0"/>
               <a:t>Relevance to ASD of the game</a:t>
             </a:r>
-            <a:endParaRPr lang="en-US" dirty="0" smtClean="0"/>
           </a:p>
           <a:p>
             <a:r>
               <a:rPr lang="en-US" dirty="0" smtClean="0"/>
               <a:t>Marketability of game</a:t>
             </a:r>
-            <a:endParaRPr lang="en-US" dirty="0" smtClean="0"/>
           </a:p>
           <a:p>
             <a:endParaRPr lang="en-US" dirty="0" smtClean="0"/>
@@ -4521,7 +4540,6 @@
               <a:rPr lang="en-US" dirty="0" smtClean="0"/>
               <a:t>(insert photo or selecting music file)</a:t>
             </a:r>
-            <a:endParaRPr lang="en-US" dirty="0" smtClean="0"/>
           </a:p>
           <a:p>
             <a:endParaRPr lang="en-US" dirty="0" smtClean="0"/>
@@ -5047,11 +5065,7 @@
           <a:p>
             <a:r>
               <a:rPr lang="en-US" sz="3600" dirty="0" smtClean="0"/>
-              <a:t>Design</a:t>
-            </a:r>
-            <a:r>
-              <a:rPr lang="en-US" sz="3600" dirty="0" smtClean="0"/>
-              <a:t> of the Game</a:t>
+              <a:t>Design of the Game</a:t>
             </a:r>
             <a:endParaRPr lang="en-US" sz="3600" dirty="0"/>
           </a:p>
@@ -5094,11 +5108,7 @@
           <a:p>
             <a:r>
               <a:rPr lang="en-US" dirty="0" smtClean="0"/>
-              <a:t>Use of GIMP to finalize images</a:t>
-            </a:r>
-            <a:r>
-              <a:rPr lang="en-US" dirty="0" smtClean="0"/>
-              <a:t>.</a:t>
+              <a:t>Use of GIMP to finalize images.</a:t>
             </a:r>
             <a:endParaRPr lang="en-US" dirty="0"/>
           </a:p>
@@ -5246,7 +5256,35 @@
           <a:p>
             <a:r>
               <a:rPr lang="en-US" dirty="0" smtClean="0"/>
-              <a:t>(photo of the song choice [maybe of two </a:t>
+              <a:t>Customization is the game itself</a:t>
+            </a:r>
+          </a:p>
+          <a:p>
+            <a:r>
+              <a:rPr lang="en-US" dirty="0" smtClean="0"/>
+              <a:t>Customization in the menu</a:t>
+            </a:r>
+          </a:p>
+          <a:p>
+            <a:r>
+              <a:rPr lang="en-US" dirty="0" smtClean="0"/>
+              <a:t>Customization in the ship</a:t>
+            </a:r>
+          </a:p>
+          <a:p>
+            <a:r>
+              <a:rPr lang="en-US" dirty="0" smtClean="0"/>
+              <a:t>Customization in the controls</a:t>
+            </a:r>
+          </a:p>
+          <a:p>
+            <a:r>
+              <a:rPr lang="en-US" dirty="0" smtClean="0"/>
+              <a:t>(</a:t>
+            </a:r>
+            <a:r>
+              <a:rPr lang="en-US" dirty="0" smtClean="0"/>
+              <a:t>photo of the song choice [maybe of two </a:t>
             </a:r>
             <a:r>
               <a:rPr lang="en-US" dirty="0" err="1" smtClean="0"/>

</xml_diff>

<commit_message>
Add new about menu
</commit_message>
<xml_diff>
--- a/presenationTWO.pptx
+++ b/presenationTWO.pptx
@@ -15,9 +15,8 @@
     <p:sldId id="266" r:id="rId9"/>
     <p:sldId id="276" r:id="rId10"/>
     <p:sldId id="277" r:id="rId11"/>
-    <p:sldId id="273" r:id="rId12"/>
-    <p:sldId id="264" r:id="rId13"/>
-    <p:sldId id="270" r:id="rId14"/>
+    <p:sldId id="264" r:id="rId12"/>
+    <p:sldId id="270" r:id="rId13"/>
   </p:sldIdLst>
   <p:sldSz cx="9144000" cy="6858000" type="screen4x3"/>
   <p:notesSz cx="6858000" cy="9144000"/>
@@ -3388,112 +3387,17 @@
   <p:clrMapOvr>
     <a:masterClrMapping/>
   </p:clrMapOvr>
+  <p:timing>
+    <p:tnLst>
+      <p:par>
+        <p:cTn xmlns:p14="http://schemas.microsoft.com/office/powerpoint/2010/main" id="1" dur="indefinite" restart="never" nodeType="tmRoot"/>
+      </p:par>
+    </p:tnLst>
+  </p:timing>
 </p:sld>
 </file>
 
 <file path=ppt/slides/slide11.xml><?xml version="1.0" encoding="utf-8"?>
-<p:sld xmlns:a="http://schemas.openxmlformats.org/drawingml/2006/main" xmlns:r="http://schemas.openxmlformats.org/officeDocument/2006/relationships" xmlns:p="http://schemas.openxmlformats.org/presentationml/2006/main">
-  <p:cSld>
-    <p:spTree>
-      <p:nvGrpSpPr>
-        <p:cNvPr id="1" name=""/>
-        <p:cNvGrpSpPr/>
-        <p:nvPr/>
-      </p:nvGrpSpPr>
-      <p:grpSpPr>
-        <a:xfrm>
-          <a:off x="0" y="0"/>
-          <a:ext cx="0" cy="0"/>
-          <a:chOff x="0" y="0"/>
-          <a:chExt cx="0" cy="0"/>
-        </a:xfrm>
-      </p:grpSpPr>
-      <p:sp>
-        <p:nvSpPr>
-          <p:cNvPr id="2" name="Title 1"/>
-          <p:cNvSpPr>
-            <a:spLocks noGrp="1"/>
-          </p:cNvSpPr>
-          <p:nvPr>
-            <p:ph type="title"/>
-          </p:nvPr>
-        </p:nvSpPr>
-        <p:spPr/>
-        <p:txBody>
-          <a:bodyPr/>
-          <a:lstStyle/>
-          <a:p>
-            <a:r>
-              <a:rPr lang="en-US" dirty="0" smtClean="0"/>
-              <a:t>WE NEEDZ ANOTHER SLIDE</a:t>
-            </a:r>
-            <a:endParaRPr lang="en-US" dirty="0"/>
-          </a:p>
-        </p:txBody>
-      </p:sp>
-      <p:sp>
-        <p:nvSpPr>
-          <p:cNvPr id="3" name="Content Placeholder 2"/>
-          <p:cNvSpPr>
-            <a:spLocks noGrp="1"/>
-          </p:cNvSpPr>
-          <p:nvPr>
-            <p:ph idx="1"/>
-          </p:nvPr>
-        </p:nvSpPr>
-        <p:spPr/>
-        <p:txBody>
-          <a:bodyPr/>
-          <a:lstStyle/>
-          <a:p>
-            <a:endParaRPr lang="en-US" dirty="0"/>
-          </a:p>
-        </p:txBody>
-      </p:sp>
-      <p:pic>
-        <p:nvPicPr>
-          <p:cNvPr id="4" name="Picture 3" descr="that1group-logo-white.jpg"/>
-          <p:cNvPicPr>
-            <a:picLocks noChangeAspect="1"/>
-          </p:cNvPicPr>
-          <p:nvPr/>
-        </p:nvPicPr>
-        <p:blipFill>
-          <a:blip r:embed="rId2">
-            <a:extLst>
-              <a:ext uri="{28A0092B-C50C-407E-A947-70E740481C1C}">
-                <a14:useLocalDpi xmlns:a14="http://schemas.microsoft.com/office/drawing/2010/main" val="0"/>
-              </a:ext>
-            </a:extLst>
-          </a:blip>
-          <a:stretch>
-            <a:fillRect/>
-          </a:stretch>
-        </p:blipFill>
-        <p:spPr>
-          <a:xfrm>
-            <a:off x="7366000" y="5715000"/>
-            <a:ext cx="1524000" cy="1143000"/>
-          </a:xfrm>
-          <a:prstGeom prst="rect">
-            <a:avLst/>
-          </a:prstGeom>
-        </p:spPr>
-      </p:pic>
-    </p:spTree>
-    <p:extLst>
-      <p:ext uri="{BB962C8B-B14F-4D97-AF65-F5344CB8AC3E}">
-        <p14:creationId xmlns:p14="http://schemas.microsoft.com/office/powerpoint/2010/main" val="681703534"/>
-      </p:ext>
-    </p:extLst>
-  </p:cSld>
-  <p:clrMapOvr>
-    <a:masterClrMapping/>
-  </p:clrMapOvr>
-</p:sld>
-</file>
-
-<file path=ppt/slides/slide12.xml><?xml version="1.0" encoding="utf-8"?>
 <p:sld xmlns:a="http://schemas.openxmlformats.org/drawingml/2006/main" xmlns:r="http://schemas.openxmlformats.org/officeDocument/2006/relationships" xmlns:p="http://schemas.openxmlformats.org/presentationml/2006/main">
   <p:cSld>
     <p:spTree>
@@ -3633,7 +3537,7 @@
 </p:sld>
 </file>
 
-<file path=ppt/slides/slide13.xml><?xml version="1.0" encoding="utf-8"?>
+<file path=ppt/slides/slide12.xml><?xml version="1.0" encoding="utf-8"?>
 <p:sld xmlns:a="http://schemas.openxmlformats.org/drawingml/2006/main" xmlns:r="http://schemas.openxmlformats.org/officeDocument/2006/relationships" xmlns:p="http://schemas.openxmlformats.org/presentationml/2006/main">
   <p:cSld>
     <p:spTree>
@@ -4132,6 +4036,13 @@
   <p:clrMapOvr>
     <a:masterClrMapping/>
   </p:clrMapOvr>
+  <p:timing>
+    <p:tnLst>
+      <p:par>
+        <p:cTn xmlns:p14="http://schemas.microsoft.com/office/powerpoint/2010/main" id="1" dur="indefinite" restart="never" nodeType="tmRoot"/>
+      </p:par>
+    </p:tnLst>
+  </p:timing>
 </p:sld>
 </file>
 
@@ -4190,19 +4101,17 @@
         <p:spPr/>
         <p:txBody>
           <a:bodyPr>
-            <a:normAutofit lnSpcReduction="10000"/>
+            <a:normAutofit/>
           </a:bodyPr>
           <a:lstStyle/>
           <a:p>
-            <a:pPr marL="0" indent="0" algn="ctr">
-              <a:buNone/>
-            </a:pPr>
-            <a:endParaRPr lang="en-US" dirty="0" smtClean="0"/>
-          </a:p>
-          <a:p>
-            <a:r>
-              <a:rPr lang="en-US" dirty="0" smtClean="0"/>
-              <a:t>Motivation for </a:t>
+            <a:r>
+              <a:rPr lang="en-US" dirty="0" smtClean="0"/>
+              <a:t>Motivation </a:t>
+            </a:r>
+            <a:r>
+              <a:rPr lang="en-US" dirty="0" smtClean="0"/>
+              <a:t>for </a:t>
             </a:r>
             <a:r>
               <a:rPr lang="en-US" dirty="0"/>
@@ -4238,8 +4147,6 @@
               <a:rPr lang="en-US" dirty="0" smtClean="0"/>
               <a:t>Rewards of game</a:t>
             </a:r>
-          </a:p>
-          <a:p>
             <a:endParaRPr lang="en-US" dirty="0" smtClean="0"/>
           </a:p>
           <a:p>
@@ -4598,6 +4505,13 @@
   <p:clrMapOvr>
     <a:masterClrMapping/>
   </p:clrMapOvr>
+  <p:timing>
+    <p:tnLst>
+      <p:par>
+        <p:cTn xmlns:p14="http://schemas.microsoft.com/office/powerpoint/2010/main" id="1" dur="indefinite" restart="never" nodeType="tmRoot"/>
+      </p:par>
+    </p:tnLst>
+  </p:timing>
 </p:sld>
 </file>
 
@@ -4733,6 +4647,13 @@
   <p:clrMapOvr>
     <a:masterClrMapping/>
   </p:clrMapOvr>
+  <p:timing>
+    <p:tnLst>
+      <p:par>
+        <p:cTn xmlns:p14="http://schemas.microsoft.com/office/powerpoint/2010/main" id="1" dur="indefinite" restart="never" nodeType="tmRoot"/>
+      </p:par>
+    </p:tnLst>
+  </p:timing>
 </p:sld>
 </file>
 
@@ -5338,6 +5259,13 @@
   <p:clrMapOvr>
     <a:masterClrMapping/>
   </p:clrMapOvr>
+  <p:timing>
+    <p:tnLst>
+      <p:par>
+        <p:cTn xmlns:p14="http://schemas.microsoft.com/office/powerpoint/2010/main" id="1" dur="indefinite" restart="never" nodeType="tmRoot"/>
+      </p:par>
+    </p:tnLst>
+  </p:timing>
 </p:sld>
 </file>
 

</xml_diff>